<commit_message>
Added Screen Capture Function
- Add and delete resource data

- Implemented the ability to capture
  the Unity editor screen and save it
  to a folder
</commit_message>
<xml_diff>
--- a/Assets/Class/Rotation/PPT Data/Rotation Example.pptx
+++ b/Assets/Class/Rotation/PPT Data/Rotation Example.pptx
@@ -2,7 +2,7 @@
 <file path=ppt/presentation.xml><?xml version="1.0" encoding="utf-8"?>
 <p:presentation xmlns:a="http://schemas.openxmlformats.org/drawingml/2006/main" xmlns:r="http://schemas.openxmlformats.org/officeDocument/2006/relationships" xmlns:p="http://schemas.openxmlformats.org/presentationml/2006/main" xmlns:p14="http://schemas.microsoft.com/office/powerpoint/2010/main" saveSubsetFonts="1" firstSlideNum="0">
   <p:sldMasterIdLst>
-    <p:sldMasterId id="2147485401" r:id="rId12"/>
+    <p:sldMasterId id="2147485410" r:id="rId12"/>
   </p:sldMasterIdLst>
   <p:notesMasterIdLst>
     <p:notesMasterId r:id="rId14"/>
@@ -5826,9 +5826,9 @@
           <p:nvPr/>
         </p:nvSpPr>
         <p:spPr>
-          <a:xfrm rot="0">
+          <a:xfrm>
             <a:off x="4344670" y="386715"/>
-            <a:ext cx="3503930" cy="554990"/>
+            <a:ext cx="3504565" cy="554990"/>
           </a:xfrm>
           <a:prstGeom prst="rect"/>
           <a:noFill/>
@@ -5855,7 +5855,7 @@
                 <a:latin typeface="맑은 고딕" charset="0"/>
                 <a:ea typeface="맑은 고딕" charset="0"/>
               </a:rPr>
-              <a:t>일곱</a:t>
+              <a:t>여덟</a:t>
             </a:r>
             <a:r>
               <a:rPr lang="ko-KR" sz="3000" b="1">
@@ -5888,7 +5888,7 @@
         <p:spPr>
           <a:xfrm rot="0">
             <a:off x="1315085" y="5255895"/>
-            <a:ext cx="4073525" cy="954405"/>
+            <a:ext cx="4074160" cy="955040"/>
           </a:xfrm>
           <a:prstGeom prst="rect"/>
           <a:noFill/>
@@ -5915,17 +5915,7 @@
                 <a:latin typeface="맑은 고딕" charset="0"/>
                 <a:ea typeface="맑은 고딕" charset="0"/>
               </a:rPr>
-              <a:t>1</a:t>
-            </a:r>
-            <a:r>
-              <a:rPr lang="ko-KR" sz="2000" b="1">
-                <a:solidFill>
-                  <a:srgbClr val="0611F2"/>
-                </a:solidFill>
-                <a:latin typeface="맑은 고딕" charset="0"/>
-                <a:ea typeface="맑은 고딕" charset="0"/>
-              </a:rPr>
-              <a:t>6</a:t>
+              <a:t>16</a:t>
             </a:r>
             <a:r>
               <a:rPr sz="2000" b="1">
@@ -6134,17 +6124,17 @@
       </p:cxnSp>
       <p:pic>
         <p:nvPicPr>
-          <p:cNvPr id="43" name="그림 22"/>
+          <p:cNvPr id="43" name="그림 22" descr="C:/Users/Admin1/AppData/Roaming/PolarisOffice/ETemp/5800_7652896/fImage125272141478.png"/>
           <p:cNvPicPr>
             <a:picLocks noChangeAspect="1"/>
           </p:cNvPicPr>
           <p:nvPr/>
         </p:nvPicPr>
         <p:blipFill rotWithShape="1">
-          <a:blip r:embed="rId4" cstate="print">
+          <a:blip r:embed="rId4" cstate="hqprint">
             <a:extLst>
               <a:ext uri="{28A0092B-C50C-407E-A947-70E740481C1C}">
-                <a14:useLocalDpi xmlns:a14="http://schemas.microsoft.com/office/drawing/2010/main" val="0"/>
+                <a14:useLocalDpi xmlns:a14="http://schemas.microsoft.com/office/drawing/2010/main"/>
               </a:ext>
             </a:extLst>
           </a:blip>
@@ -6154,8 +6144,8 @@
         </p:blipFill>
         <p:spPr>
           <a:xfrm rot="0">
-            <a:off x="6806565" y="3853180"/>
-            <a:ext cx="4109720" cy="1585595"/>
+            <a:off x="6808470" y="3856355"/>
+            <a:ext cx="4110355" cy="1586230"/>
           </a:xfrm>
           <a:prstGeom prst="roundRect"/>
           <a:solidFill>
@@ -6173,8 +6163,8 @@
         </p:nvSpPr>
         <p:spPr>
           <a:xfrm rot="0">
-            <a:off x="6800215" y="5534660"/>
-            <a:ext cx="4117340" cy="677545"/>
+            <a:off x="6802120" y="5537835"/>
+            <a:ext cx="4117975" cy="678180"/>
           </a:xfrm>
           <a:prstGeom prst="rect"/>
           <a:noFill/>
@@ -6201,17 +6191,7 @@
                 <a:latin typeface="맑은 고딕" charset="0"/>
                 <a:ea typeface="맑은 고딕" charset="0"/>
               </a:rPr>
-              <a:t>1</a:t>
-            </a:r>
-            <a:r>
-              <a:rPr lang="ko-KR" sz="2000" b="1">
-                <a:solidFill>
-                  <a:srgbClr val="0611F2"/>
-                </a:solidFill>
-                <a:latin typeface="맑은 고딕" charset="0"/>
-                <a:ea typeface="맑은 고딕" charset="0"/>
-              </a:rPr>
-              <a:t>8</a:t>
+              <a:t>18</a:t>
             </a:r>
             <a:r>
               <a:rPr sz="2000" b="1">
@@ -6299,7 +6279,7 @@
 </file>
 
 <file path=ppt/slides/slide11.xml><?xml version="1.0" encoding="utf-8"?>
-<p:sld xmlns:a="http://schemas.openxmlformats.org/drawingml/2006/main" xmlns:r="http://schemas.openxmlformats.org/officeDocument/2006/relationships" xmlns:p="http://schemas.openxmlformats.org/presentationml/2006/main">
+<p:sld xmlns:a="http://schemas.openxmlformats.org/drawingml/2006/main" xmlns:r="http://schemas.openxmlformats.org/officeDocument/2006/relationships" xmlns:p="http://schemas.openxmlformats.org/presentationml/2006/main" xmlns:p14="http://schemas.microsoft.com/office/powerpoint/2010/main">
   <p:cSld>
     <p:spTree>
       <p:nvGrpSpPr>
@@ -6326,7 +6306,7 @@
         <p:spPr>
           <a:xfrm rot="0">
             <a:off x="4344670" y="386715"/>
-            <a:ext cx="3504565" cy="554990"/>
+            <a:ext cx="3579495" cy="554990"/>
           </a:xfrm>
           <a:prstGeom prst="rect"/>
           <a:noFill/>
@@ -6353,7 +6333,7 @@
                 <a:latin typeface="맑은 고딕" charset="0"/>
                 <a:ea typeface="맑은 고딕" charset="0"/>
               </a:rPr>
-              <a:t>여덟</a:t>
+              <a:t>아홉</a:t>
             </a:r>
             <a:r>
               <a:rPr lang="ko-KR" sz="3000" b="1">
@@ -6475,7 +6455,7 @@
       </p:sp>
       <p:pic>
         <p:nvPicPr>
-          <p:cNvPr id="46" name="Picture " descr="C:/Users/Admin1/AppData/Roaming/PolarisOffice/ETemp/28884_16498880/fImage191582266962.png"/>
+          <p:cNvPr id="46" name="Picture "/>
           <p:cNvPicPr>
             <a:picLocks noChangeAspect="1"/>
           </p:cNvPicPr>
@@ -6506,7 +6486,7 @@
       </p:pic>
       <p:pic>
         <p:nvPicPr>
-          <p:cNvPr id="47" name="Picture " descr="C:/Users/Admin1/AppData/Roaming/PolarisOffice/ETemp/28884_16498880/fImage91502274464.png"/>
+          <p:cNvPr id="47" name="Picture "/>
           <p:cNvPicPr>
             <a:picLocks noChangeAspect="1"/>
           </p:cNvPicPr>
@@ -6537,7 +6517,7 @@
       </p:pic>
       <p:pic>
         <p:nvPicPr>
-          <p:cNvPr id="48" name="Picture " descr="C:/Users/Admin1/AppData/Roaming/PolarisOffice/ETemp/28884_16498880/fImage1850021941.png"/>
+          <p:cNvPr id="48" name="Picture "/>
           <p:cNvPicPr>
             <a:picLocks noChangeAspect="1"/>
           </p:cNvPicPr>
@@ -6568,7 +6548,7 @@
       </p:pic>
       <p:pic>
         <p:nvPicPr>
-          <p:cNvPr id="49" name="Picture " descr="C:/Users/Admin1/AppData/Roaming/PolarisOffice/ETemp/28884_16498880/fImage80432208467.png"/>
+          <p:cNvPr id="49" name="Picture "/>
           <p:cNvPicPr>
             <a:picLocks noChangeAspect="1"/>
           </p:cNvPicPr>
@@ -6751,9 +6731,9 @@
           <p:nvPr/>
         </p:nvSpPr>
         <p:spPr>
-          <a:xfrm>
-            <a:off x="4344670" y="386715"/>
-            <a:ext cx="3504565" cy="554990"/>
+          <a:xfrm rot="0">
+            <a:off x="4344670" y="377825"/>
+            <a:ext cx="3501390" cy="554990"/>
           </a:xfrm>
           <a:prstGeom prst="rect"/>
           <a:noFill/>
@@ -6780,7 +6760,7 @@
                 <a:latin typeface="맑은 고딕" charset="0"/>
                 <a:ea typeface="맑은 고딕" charset="0"/>
               </a:rPr>
-              <a:t>아홉</a:t>
+              <a:t>열</a:t>
             </a:r>
             <a:r>
               <a:rPr lang="ko-KR" sz="3000" b="1">
@@ -6875,7 +6855,7 @@
       </p:sp>
       <p:pic>
         <p:nvPicPr>
-          <p:cNvPr id="51" name="그림 7" descr="C:/Users/Admin1/AppData/Roaming/PolarisOffice/ETemp/28884_16498880/fImage121592226334.png"/>
+          <p:cNvPr id="51" name="그림 7"/>
           <p:cNvPicPr>
             <a:picLocks noChangeAspect="1"/>
           </p:cNvPicPr>
@@ -6906,7 +6886,7 @@
       </p:pic>
       <p:pic>
         <p:nvPicPr>
-          <p:cNvPr id="52" name="그림 10" descr="C:/Users/Admin1/AppData/Roaming/PolarisOffice/ETemp/28884_16498880/fImage138792236500.png"/>
+          <p:cNvPr id="52" name="그림 10"/>
           <p:cNvPicPr>
             <a:picLocks noChangeAspect="1"/>
           </p:cNvPicPr>
@@ -6937,7 +6917,7 @@
       </p:pic>
       <p:pic>
         <p:nvPicPr>
-          <p:cNvPr id="53" name="그림 13" descr="C:/Users/Admin1/AppData/Roaming/PolarisOffice/ETemp/28884_16498880/fImage40062026334.png"/>
+          <p:cNvPr id="53" name="그림 13"/>
           <p:cNvPicPr>
             <a:picLocks noChangeAspect="1"/>
           </p:cNvPicPr>
@@ -7046,7 +7026,7 @@
       </p:sp>
       <p:pic>
         <p:nvPicPr>
-          <p:cNvPr id="55" name="그림 15" descr="C:/Users/Admin1/AppData/Roaming/PolarisOffice/ETemp/28884_16498880/fImage118882269169.png"/>
+          <p:cNvPr id="55" name="그림 15"/>
           <p:cNvPicPr>
             <a:picLocks noChangeAspect="1"/>
           </p:cNvPicPr>
@@ -9225,8 +9205,8 @@
         </p:nvSpPr>
         <p:spPr>
           <a:xfrm rot="0">
-            <a:off x="1265555" y="2280285"/>
-            <a:ext cx="4135755" cy="1231265"/>
+            <a:off x="1256665" y="2626995"/>
+            <a:ext cx="4136390" cy="1231900"/>
           </a:xfrm>
           <a:prstGeom prst="rect"/>
           <a:noFill/>
@@ -9236,7 +9216,7 @@
           </a:ln>
         </p:spPr>
         <p:txBody>
-          <a:bodyPr wrap="square" lIns="89535" tIns="46355" rIns="89535" bIns="46355" vert="horz" anchor="t">
+          <a:bodyPr wrap="square" lIns="89535" tIns="46355" rIns="89535" bIns="46355" numCol="1" vert="horz" anchor="t">
             <a:spAutoFit/>
           </a:bodyPr>
           <a:lstStyle/>
@@ -9295,14 +9275,45 @@
       </p:sp>
       <p:pic>
         <p:nvPicPr>
-          <p:cNvPr id="19" name="그림 78"/>
+          <p:cNvPr id="20" name="그림 81" descr="C:/Users/Admin1/AppData/Roaming/PolarisOffice/ETemp/5800_7652896/fImage38052071942.png"/>
           <p:cNvPicPr>
             <a:picLocks noChangeAspect="1"/>
           </p:cNvPicPr>
           <p:nvPr/>
         </p:nvPicPr>
         <p:blipFill rotWithShape="1">
-          <a:blip r:embed="rId2" cstate="print">
+          <a:blip r:embed="rId3" cstate="hqprint">
+            <a:extLst>
+              <a:ext uri="{28A0092B-C50C-407E-A947-70E740481C1C}">
+                <a14:useLocalDpi xmlns:a14="http://schemas.microsoft.com/office/drawing/2010/main"/>
+              </a:ext>
+            </a:extLst>
+          </a:blip>
+          <a:stretch>
+            <a:fillRect/>
+          </a:stretch>
+        </p:blipFill>
+        <p:spPr>
+          <a:xfrm rot="0">
+            <a:off x="1259840" y="1271270"/>
+            <a:ext cx="1070610" cy="1145540"/>
+          </a:xfrm>
+          <a:prstGeom prst="roundRect"/>
+          <a:solidFill>
+            <a:srgbClr val="EDEDED"/>
+          </a:solidFill>
+        </p:spPr>
+      </p:pic>
+      <p:pic>
+        <p:nvPicPr>
+          <p:cNvPr id="26" name="그림 94"/>
+          <p:cNvPicPr>
+            <a:picLocks noChangeAspect="1"/>
+          </p:cNvPicPr>
+          <p:nvPr/>
+        </p:nvPicPr>
+        <p:blipFill rotWithShape="1">
+          <a:blip r:embed="rId6" cstate="print">
             <a:extLst>
               <a:ext uri="{28A0092B-C50C-407E-A947-70E740481C1C}">
                 <a14:useLocalDpi xmlns:a14="http://schemas.microsoft.com/office/drawing/2010/main" val="0"/>
@@ -9315,8 +9326,37 @@
         </p:blipFill>
         <p:spPr>
           <a:xfrm rot="0">
-            <a:off x="2834640" y="1284605"/>
-            <a:ext cx="2564130" cy="848360"/>
+            <a:off x="6824980" y="1269365"/>
+            <a:ext cx="4133850" cy="1973580"/>
+          </a:xfrm>
+          <a:prstGeom prst="rect"/>
+          <a:noFill/>
+        </p:spPr>
+      </p:pic>
+      <p:pic>
+        <p:nvPicPr>
+          <p:cNvPr id="27" name="그림 5" descr="C:/Users/Admin1/AppData/Roaming/PolarisOffice/ETemp/5800_7652896/fImage11845223292.png"/>
+          <p:cNvPicPr>
+            <a:picLocks noChangeAspect="1"/>
+          </p:cNvPicPr>
+          <p:nvPr/>
+        </p:nvPicPr>
+        <p:blipFill rotWithShape="1">
+          <a:blip r:embed="rId7" cstate="hqprint">
+            <a:extLst>
+              <a:ext uri="{28A0092B-C50C-407E-A947-70E740481C1C}">
+                <a14:useLocalDpi xmlns:a14="http://schemas.microsoft.com/office/drawing/2010/main"/>
+              </a:ext>
+            </a:extLst>
+          </a:blip>
+          <a:stretch>
+            <a:fillRect/>
+          </a:stretch>
+        </p:blipFill>
+        <p:spPr>
+          <a:xfrm rot="0">
+            <a:off x="1266190" y="4009390"/>
+            <a:ext cx="4129405" cy="1420495"/>
           </a:xfrm>
           <a:prstGeom prst="roundRect"/>
           <a:solidFill>
@@ -9324,16 +9364,101 @@
           </a:solidFill>
         </p:spPr>
       </p:pic>
+      <p:sp>
+        <p:nvSpPr>
+          <p:cNvPr id="28" name="텍스트 상자 6"/>
+          <p:cNvSpPr txBox="1">
+            <a:spLocks/>
+          </p:cNvSpPr>
+          <p:nvPr/>
+        </p:nvSpPr>
+        <p:spPr>
+          <a:xfrm rot="0">
+            <a:off x="1263015" y="5530215"/>
+            <a:ext cx="4149725" cy="677545"/>
+          </a:xfrm>
+          <a:prstGeom prst="rect"/>
+          <a:noFill/>
+          <a:ln w="0">
+            <a:noFill/>
+            <a:prstDash/>
+          </a:ln>
+        </p:spPr>
+        <p:txBody>
+          <a:bodyPr wrap="square" lIns="89535" tIns="46355" rIns="89535" bIns="46355" numCol="1" vert="horz" anchor="t">
+            <a:spAutoFit/>
+          </a:bodyPr>
+          <a:lstStyle/>
+          <a:p>
+            <a:pPr marL="0" indent="0" rtl="0" algn="l" defTabSz="914400" eaLnBrk="1" latinLnBrk="0" hangingPunct="1">
+              <a:buFontTx/>
+              <a:buNone/>
+            </a:pPr>
+            <a:r>
+              <a:rPr lang="ko-KR" sz="2000" b="1">
+                <a:solidFill>
+                  <a:srgbClr val="0611F2"/>
+                </a:solidFill>
+                <a:latin typeface="맑은 고딕" charset="0"/>
+                <a:ea typeface="맑은 고딕" charset="0"/>
+              </a:rPr>
+              <a:t>7</a:t>
+            </a:r>
+            <a:r>
+              <a:rPr sz="2000" b="1">
+                <a:solidFill>
+                  <a:srgbClr val="0611F2"/>
+                </a:solidFill>
+                <a:latin typeface="맑은 고딕" charset="0"/>
+                <a:ea typeface="맑은 고딕" charset="0"/>
+              </a:rPr>
+              <a:t>.</a:t>
+            </a:r>
+            <a:r>
+              <a:rPr sz="2000">
+                <a:latin typeface="맑은 고딕" charset="0"/>
+                <a:ea typeface="맑은 고딕" charset="0"/>
+              </a:rPr>
+              <a:t> </a:t>
+            </a:r>
+            <a:r>
+              <a:rPr lang="ko-KR" sz="1800">
+                <a:latin typeface="맑은 고딕" charset="0"/>
+                <a:ea typeface="맑은 고딕" charset="0"/>
+              </a:rPr>
+              <a:t>그다음 Earth 오브젝트</a:t>
+            </a:r>
+            <a:r>
+              <a:rPr lang="ko-KR" sz="1800">
+                <a:latin typeface="맑은 고딕" charset="0"/>
+                <a:ea typeface="맑은 고딕" charset="0"/>
+              </a:rPr>
+              <a:t>의 </a:t>
+            </a:r>
+            <a:r>
+              <a:rPr lang="ko-KR" sz="1800">
+                <a:latin typeface="맑은 고딕" charset="0"/>
+                <a:ea typeface="맑은 고딕" charset="0"/>
+              </a:rPr>
+              <a:t>위치와 크기값을 설정합니다.</a:t>
+            </a:r>
+            <a:endParaRPr lang="ko-KR" altLang="en-US" sz="1800">
+              <a:latin typeface="맑은 고딕" charset="0"/>
+              <a:ea typeface="맑은 고딕" charset="0"/>
+            </a:endParaRPr>
+          </a:p>
+        </p:txBody>
+      </p:sp>
       <p:pic>
         <p:nvPicPr>
-          <p:cNvPr id="20" name="그림 81"/>
+          <p:cNvPr id="29" name="그림 7" descr="C:/Users/Admin1/AppData/Roaming/PolarisOffice/ETemp/5800_7652896/fImage793215641.png"/>
           <p:cNvPicPr>
             <a:picLocks noChangeAspect="1"/>
           </p:cNvPicPr>
           <p:nvPr/>
         </p:nvPicPr>
         <p:blipFill rotWithShape="1">
-          <a:blip r:embed="rId3" cstate="print">
+          <a:blip r:embed="rId8" cstate="print">
             <a:extLst>
               <a:ext uri="{28A0092B-C50C-407E-A947-70E740481C1C}">
                 <a14:useLocalDpi xmlns:a14="http://schemas.microsoft.com/office/drawing/2010/main" val="0"/>
@@ -9346,8 +9471,8 @@
         </p:blipFill>
         <p:spPr>
           <a:xfrm rot="0">
-            <a:off x="1259840" y="1271270"/>
-            <a:ext cx="1210310" cy="874395"/>
+            <a:off x="2537460" y="1281430"/>
+            <a:ext cx="2866390" cy="1130935"/>
           </a:xfrm>
           <a:prstGeom prst="roundRect"/>
           <a:solidFill>
@@ -9363,13 +9488,12 @@
         </p:nvCxnSpPr>
         <p:spPr>
           <a:xfrm rot="0" flipV="1">
-            <a:off x="1804035" y="1795780"/>
-            <a:ext cx="3525520" cy="66675"/>
+            <a:off x="1732280" y="1965960"/>
+            <a:ext cx="3594100" cy="95885"/>
           </a:xfrm>
           <a:prstGeom prst="straightConnector1"/>
           <a:ln w="6350" cap="flat" cmpd="sng">
             <a:prstDash/>
-            <a:headEnd type="none" w="med" len="med"/>
             <a:tailEnd type="triangle" w="med" len="med"/>
           </a:ln>
         </p:spPr>
@@ -9388,203 +9512,6 @@
           </a:fontRef>
         </p:style>
       </p:cxnSp>
-      <p:pic>
-        <p:nvPicPr>
-          <p:cNvPr id="22" name="그림 85"/>
-          <p:cNvPicPr>
-            <a:picLocks noChangeAspect="1"/>
-          </p:cNvPicPr>
-          <p:nvPr/>
-        </p:nvPicPr>
-        <p:blipFill rotWithShape="1">
-          <a:blip r:embed="rId4" cstate="print">
-            <a:extLst>
-              <a:ext uri="{28A0092B-C50C-407E-A947-70E740481C1C}">
-                <a14:useLocalDpi xmlns:a14="http://schemas.microsoft.com/office/drawing/2010/main" val="0"/>
-              </a:ext>
-            </a:extLst>
-          </a:blip>
-          <a:stretch>
-            <a:fillRect/>
-          </a:stretch>
-        </p:blipFill>
-        <p:spPr>
-          <a:xfrm rot="0">
-            <a:off x="1262380" y="3801745"/>
-            <a:ext cx="2844800" cy="1286510"/>
-          </a:xfrm>
-          <a:prstGeom prst="roundRect"/>
-          <a:solidFill>
-            <a:srgbClr val="EDEDED"/>
-          </a:solidFill>
-        </p:spPr>
-      </p:pic>
-      <p:pic>
-        <p:nvPicPr>
-          <p:cNvPr id="23" name="그림 88"/>
-          <p:cNvPicPr>
-            <a:picLocks noChangeAspect="1"/>
-          </p:cNvPicPr>
-          <p:nvPr/>
-        </p:nvPicPr>
-        <p:blipFill rotWithShape="1">
-          <a:blip r:embed="rId5" cstate="print">
-            <a:extLst>
-              <a:ext uri="{28A0092B-C50C-407E-A947-70E740481C1C}">
-                <a14:useLocalDpi xmlns:a14="http://schemas.microsoft.com/office/drawing/2010/main" val="0"/>
-              </a:ext>
-            </a:extLst>
-          </a:blip>
-          <a:stretch>
-            <a:fillRect/>
-          </a:stretch>
-        </p:blipFill>
-        <p:spPr>
-          <a:xfrm rot="0">
-            <a:off x="4672330" y="4001135"/>
-            <a:ext cx="731520" cy="867410"/>
-          </a:xfrm>
-          <a:prstGeom prst="roundRect"/>
-          <a:solidFill>
-            <a:srgbClr val="EDEDED"/>
-          </a:solidFill>
-        </p:spPr>
-      </p:pic>
-      <p:cxnSp>
-        <p:nvCxnSpPr>
-          <p:cNvPr id="24" name="도형 91"/>
-          <p:cNvCxnSpPr>
-            <a:stCxn id="23" idx="1"/>
-          </p:cNvCxnSpPr>
-          <p:nvPr/>
-        </p:nvCxnSpPr>
-        <p:spPr>
-          <a:xfrm rot="0" flipH="1">
-            <a:off x="3766185" y="4434205"/>
-            <a:ext cx="906780" cy="5715"/>
-          </a:xfrm>
-          <a:prstGeom prst="straightConnector1"/>
-          <a:ln w="6350" cap="flat" cmpd="sng">
-            <a:prstDash/>
-            <a:headEnd type="none" w="med" len="med"/>
-            <a:tailEnd type="triangle" w="med" len="med"/>
-          </a:ln>
-        </p:spPr>
-        <p:style>
-          <a:lnRef idx="1">
-            <a:schemeClr val="accent1"/>
-          </a:lnRef>
-          <a:fillRef idx="0">
-            <a:schemeClr val="accent1"/>
-          </a:fillRef>
-          <a:effectRef idx="0">
-            <a:schemeClr val="accent1"/>
-          </a:effectRef>
-          <a:fontRef idx="minor">
-            <a:schemeClr val="tx1"/>
-          </a:fontRef>
-        </p:style>
-      </p:cxnSp>
-      <p:sp>
-        <p:nvSpPr>
-          <p:cNvPr id="25" name="텍스트 상자 92"/>
-          <p:cNvSpPr txBox="1">
-            <a:spLocks/>
-          </p:cNvSpPr>
-          <p:nvPr/>
-        </p:nvSpPr>
-        <p:spPr>
-          <a:xfrm rot="0">
-            <a:off x="1262380" y="5253355"/>
-            <a:ext cx="4135755" cy="954405"/>
-          </a:xfrm>
-          <a:prstGeom prst="rect"/>
-          <a:noFill/>
-          <a:ln w="0">
-            <a:noFill/>
-            <a:prstDash/>
-          </a:ln>
-        </p:spPr>
-        <p:txBody>
-          <a:bodyPr wrap="square" lIns="89535" tIns="46355" rIns="89535" bIns="46355" vert="horz" anchor="t">
-            <a:spAutoFit/>
-          </a:bodyPr>
-          <a:lstStyle/>
-          <a:p>
-            <a:pPr marL="0" indent="0" rtl="0" algn="l" defTabSz="914400" eaLnBrk="1" latinLnBrk="0" hangingPunct="1">
-              <a:buFontTx/>
-              <a:buNone/>
-            </a:pPr>
-            <a:r>
-              <a:rPr lang="ko-KR" sz="2000" b="1">
-                <a:solidFill>
-                  <a:srgbClr val="0611F2"/>
-                </a:solidFill>
-                <a:latin typeface="맑은 고딕" charset="0"/>
-                <a:ea typeface="맑은 고딕" charset="0"/>
-              </a:rPr>
-              <a:t>7</a:t>
-            </a:r>
-            <a:r>
-              <a:rPr sz="2000" b="1">
-                <a:solidFill>
-                  <a:srgbClr val="0611F2"/>
-                </a:solidFill>
-                <a:latin typeface="맑은 고딕" charset="0"/>
-                <a:ea typeface="맑은 고딕" charset="0"/>
-              </a:rPr>
-              <a:t>.</a:t>
-            </a:r>
-            <a:r>
-              <a:rPr sz="2000">
-                <a:latin typeface="맑은 고딕" charset="0"/>
-                <a:ea typeface="맑은 고딕" charset="0"/>
-              </a:rPr>
-              <a:t> </a:t>
-            </a:r>
-            <a:r>
-              <a:rPr lang="ko-KR" sz="1800">
-                <a:latin typeface="맑은 고딕" charset="0"/>
-                <a:ea typeface="맑은 고딕" charset="0"/>
-              </a:rPr>
-              <a:t>그런 다음 Observe 스크립트를 생성하고 StoneMonster 오브젝트에 넣어줍니다.  </a:t>
-            </a:r>
-            <a:endParaRPr lang="ko-KR" altLang="en-US" sz="1800">
-              <a:latin typeface="맑은 고딕" charset="0"/>
-              <a:ea typeface="맑은 고딕" charset="0"/>
-            </a:endParaRPr>
-          </a:p>
-        </p:txBody>
-      </p:sp>
-      <p:pic>
-        <p:nvPicPr>
-          <p:cNvPr id="26" name="그림 94"/>
-          <p:cNvPicPr>
-            <a:picLocks noChangeAspect="1"/>
-          </p:cNvPicPr>
-          <p:nvPr/>
-        </p:nvPicPr>
-        <p:blipFill rotWithShape="1">
-          <a:blip r:embed="rId6" cstate="print">
-            <a:extLst>
-              <a:ext uri="{28A0092B-C50C-407E-A947-70E740481C1C}">
-                <a14:useLocalDpi xmlns:a14="http://schemas.microsoft.com/office/drawing/2010/main" val="0"/>
-              </a:ext>
-            </a:extLst>
-          </a:blip>
-          <a:stretch>
-            <a:fillRect/>
-          </a:stretch>
-        </p:blipFill>
-        <p:spPr>
-          <a:xfrm rot="0">
-            <a:off x="6824980" y="1269365"/>
-            <a:ext cx="4133850" cy="1973580"/>
-          </a:xfrm>
-          <a:prstGeom prst="rect"/>
-          <a:noFill/>
-        </p:spPr>
-      </p:pic>
     </p:spTree>
   </p:cSld>
   <p:clrMapOvr>
@@ -10001,8 +9928,8 @@
         </p:nvSpPr>
         <p:spPr>
           <a:xfrm rot="0">
-            <a:off x="4471035" y="447040"/>
-            <a:ext cx="3241675" cy="554990"/>
+            <a:off x="4340860" y="447040"/>
+            <a:ext cx="3513455" cy="554990"/>
           </a:xfrm>
           <a:prstGeom prst="rect"/>
           <a:noFill/>
@@ -10012,7 +9939,7 @@
           </a:ln>
         </p:spPr>
         <p:txBody>
-          <a:bodyPr wrap="square" lIns="89535" tIns="46355" rIns="89535" bIns="46355" vert="horz" anchor="t">
+          <a:bodyPr wrap="square" lIns="89535" tIns="46355" rIns="89535" bIns="46355" numCol="1" vert="horz" anchor="t">
             <a:spAutoFit/>
           </a:bodyPr>
           <a:lstStyle/>
@@ -10029,56 +9956,22 @@
                 <a:latin typeface="맑은 고딕" charset="0"/>
                 <a:ea typeface="맑은 고딕" charset="0"/>
               </a:rPr>
-              <a:t>Vector3.Distance</a:t>
+              <a:t>다</a:t>
+            </a:r>
+            <a:r>
+              <a:rPr lang="ko-KR" sz="3000" b="1">
+                <a:solidFill>
+                  <a:schemeClr val="tx1"/>
+                </a:solidFill>
+                <a:latin typeface="맑은 고딕" charset="0"/>
+                <a:ea typeface="맑은 고딕" charset="0"/>
+              </a:rPr>
+              <a:t>섯 번째 튜토리얼</a:t>
             </a:r>
             <a:endParaRPr lang="ko-KR" altLang="en-US" sz="3000" b="1">
               <a:solidFill>
                 <a:schemeClr val="tx1"/>
               </a:solidFill>
-              <a:latin typeface="맑은 고딕" charset="0"/>
-              <a:ea typeface="맑은 고딕" charset="0"/>
-            </a:endParaRPr>
-          </a:p>
-        </p:txBody>
-      </p:sp>
-      <p:sp>
-        <p:nvSpPr>
-          <p:cNvPr id="4" name="텍스트 상자 10"/>
-          <p:cNvSpPr txBox="1">
-            <a:spLocks/>
-          </p:cNvSpPr>
-          <p:nvPr/>
-        </p:nvSpPr>
-        <p:spPr>
-          <a:xfrm rot="0">
-            <a:off x="1163955" y="1280795"/>
-            <a:ext cx="4224655" cy="647065"/>
-          </a:xfrm>
-          <a:prstGeom prst="rect"/>
-          <a:noFill/>
-          <a:ln w="0">
-            <a:noFill/>
-            <a:prstDash/>
-          </a:ln>
-        </p:spPr>
-        <p:txBody>
-          <a:bodyPr wrap="square" lIns="89535" tIns="46355" rIns="89535" bIns="46355" vert="horz" anchor="t">
-            <a:spAutoFit/>
-          </a:bodyPr>
-          <a:lstStyle/>
-          <a:p>
-            <a:pPr marL="0" indent="0" rtl="0" algn="l" defTabSz="914400" eaLnBrk="1" latinLnBrk="0" hangingPunct="1">
-              <a:buFontTx/>
-              <a:buNone/>
-            </a:pPr>
-            <a:r>
-              <a:rPr sz="1800">
-                <a:latin typeface="맑은 고딕" charset="0"/>
-                <a:ea typeface="맑은 고딕" charset="0"/>
-              </a:rPr>
-              <a:t>Vector3.Distance( ) 함수는 두 오브젝트 간의 거리를 구하는 함수입니다.</a:t>
-            </a:r>
-            <a:endParaRPr lang="ko-KR" altLang="en-US" sz="1800">
               <a:latin typeface="맑은 고딕" charset="0"/>
               <a:ea typeface="맑은 고딕" charset="0"/>
             </a:endParaRPr>
@@ -10095,8 +9988,8 @@
         </p:nvSpPr>
         <p:spPr>
           <a:xfrm rot="0">
-            <a:off x="1155700" y="5313045"/>
-            <a:ext cx="4230370" cy="923925"/>
+            <a:off x="1164590" y="4516120"/>
+            <a:ext cx="4213860" cy="1754505"/>
           </a:xfrm>
           <a:prstGeom prst="rect"/>
           <a:noFill/>
@@ -10120,32 +10013,291 @@
                 <a:latin typeface="맑은 고딕" charset="0"/>
                 <a:ea typeface="맑은 고딕" charset="0"/>
               </a:rPr>
-              <a:t>Vector3.Distance( )는</a:t>
-            </a:r>
-            <a:r>
-              <a:rPr lang="ko-KR" sz="1800">
-                <a:latin typeface="맑은 고딕" charset="0"/>
-                <a:ea typeface="맑은 고딕" charset="0"/>
-              </a:rPr>
-              <a:t> 오브젝트의 x축, y축, z축 전체를 계산하여 거리를 측정합니다.</a:t>
+              <a:t>Vector3.Distance( ) 함수는 두 오브젝트 간의 거리를 구하는 함수입니다.</a:t>
             </a:r>
             <a:endParaRPr lang="ko-KR" altLang="en-US" sz="1800">
               <a:latin typeface="맑은 고딕" charset="0"/>
               <a:ea typeface="맑은 고딕" charset="0"/>
             </a:endParaRPr>
           </a:p>
+          <a:p>
+            <a:pPr marL="0" indent="0" rtl="0" algn="l" defTabSz="914400" eaLnBrk="1" latinLnBrk="0" hangingPunct="1">
+              <a:buFontTx/>
+              <a:buNone/>
+            </a:pPr>
+            <a:endParaRPr lang="ko-KR" altLang="en-US" sz="1800">
+              <a:latin typeface="맑은 고딕" charset="0"/>
+              <a:ea typeface="맑은 고딕" charset="0"/>
+            </a:endParaRPr>
+          </a:p>
+          <a:p>
+            <a:pPr marL="0" indent="0" rtl="0" algn="l" defTabSz="914400" eaLnBrk="1" latinLnBrk="0" hangingPunct="1">
+              <a:buFontTx/>
+              <a:buNone/>
+            </a:pPr>
+            <a:r>
+              <a:rPr sz="1800">
+                <a:latin typeface="맑은 고딕" charset="0"/>
+                <a:ea typeface="맑은 고딕" charset="0"/>
+              </a:rPr>
+              <a:t>Vector3.Distance( )</a:t>
+            </a:r>
+            <a:r>
+              <a:rPr sz="1800">
+                <a:latin typeface="맑은 고딕" charset="0"/>
+                <a:ea typeface="맑은 고딕" charset="0"/>
+              </a:rPr>
+              <a:t> 함수</a:t>
+            </a:r>
+            <a:r>
+              <a:rPr lang="ko-KR" sz="1800">
+                <a:latin typeface="맑은 고딕" charset="0"/>
+                <a:ea typeface="맑은 고딕" charset="0"/>
+              </a:rPr>
+              <a:t>의 경우</a:t>
+            </a:r>
+            <a:r>
+              <a:rPr lang="ko-KR" sz="1800">
+                <a:latin typeface="맑은 고딕" charset="0"/>
+                <a:ea typeface="맑은 고딕" charset="0"/>
+              </a:rPr>
+              <a:t> 오브젝트의 x축, y축, z축</a:t>
+            </a:r>
+            <a:r>
+              <a:rPr lang="ko-KR" sz="1800">
+                <a:latin typeface="맑은 고딕" charset="0"/>
+                <a:ea typeface="맑은 고딕" charset="0"/>
+              </a:rPr>
+              <a:t>을</a:t>
+            </a:r>
+            <a:r>
+              <a:rPr lang="ko-KR" sz="1800">
+                <a:latin typeface="맑은 고딕" charset="0"/>
+                <a:ea typeface="맑은 고딕" charset="0"/>
+              </a:rPr>
+              <a:t> 계산하여 거리를 측정합니다.</a:t>
+            </a:r>
+            <a:endParaRPr lang="ko-KR" altLang="en-US" sz="1800">
+              <a:latin typeface="맑은 고딕" charset="0"/>
+              <a:ea typeface="맑은 고딕" charset="0"/>
+            </a:endParaRPr>
+          </a:p>
         </p:txBody>
       </p:sp>
       <p:pic>
         <p:nvPicPr>
-          <p:cNvPr id="7" name="그림 104"/>
+          <p:cNvPr id="8" name="그림 107" descr="C:/Users/Admin1/AppData/Roaming/PolarisOffice/ETemp/5800_7652896/fImage6638220153.png"/>
           <p:cNvPicPr>
             <a:picLocks noChangeAspect="1"/>
           </p:cNvPicPr>
           <p:nvPr/>
         </p:nvPicPr>
         <p:blipFill rotWithShape="1">
-          <a:blip r:embed="rId3" cstate="print">
+          <a:blip r:embed="rId4" cstate="hqprint">
+            <a:extLst>
+              <a:ext uri="{28A0092B-C50C-407E-A947-70E740481C1C}">
+                <a14:useLocalDpi xmlns:a14="http://schemas.microsoft.com/office/drawing/2010/main"/>
+              </a:ext>
+            </a:extLst>
+          </a:blip>
+          <a:stretch>
+            <a:fillRect/>
+          </a:stretch>
+        </p:blipFill>
+        <p:spPr>
+          <a:xfrm rot="0">
+            <a:off x="8087995" y="1445895"/>
+            <a:ext cx="2771140" cy="892810"/>
+          </a:xfrm>
+          <a:prstGeom prst="roundRect"/>
+          <a:solidFill>
+            <a:srgbClr val="EDEDED"/>
+          </a:solidFill>
+        </p:spPr>
+      </p:pic>
+      <p:sp>
+        <p:nvSpPr>
+          <p:cNvPr id="10" name="텍스트 상자 111"/>
+          <p:cNvSpPr txBox="1">
+            <a:spLocks/>
+          </p:cNvSpPr>
+          <p:nvPr/>
+        </p:nvSpPr>
+        <p:spPr>
+          <a:xfrm rot="0">
+            <a:off x="6807835" y="2461260"/>
+            <a:ext cx="4051300" cy="954405"/>
+          </a:xfrm>
+          <a:prstGeom prst="rect"/>
+          <a:noFill/>
+          <a:ln w="0">
+            <a:noFill/>
+            <a:prstDash/>
+          </a:ln>
+        </p:spPr>
+        <p:txBody>
+          <a:bodyPr wrap="square" lIns="89535" tIns="46355" rIns="89535" bIns="46355" numCol="1" vert="horz" anchor="t">
+            <a:spAutoFit/>
+          </a:bodyPr>
+          <a:lstStyle/>
+          <a:p>
+            <a:pPr marL="0" indent="0" rtl="0" algn="l" defTabSz="914400" eaLnBrk="1" latinLnBrk="0" hangingPunct="1">
+              <a:buFontTx/>
+              <a:buNone/>
+            </a:pPr>
+            <a:r>
+              <a:rPr lang="ko-KR" sz="2000" b="1">
+                <a:solidFill>
+                  <a:srgbClr val="0611F2"/>
+                </a:solidFill>
+                <a:latin typeface="맑은 고딕" charset="0"/>
+                <a:ea typeface="맑은 고딕" charset="0"/>
+              </a:rPr>
+              <a:t>9</a:t>
+            </a:r>
+            <a:r>
+              <a:rPr sz="2000" b="1">
+                <a:solidFill>
+                  <a:srgbClr val="0611F2"/>
+                </a:solidFill>
+                <a:latin typeface="맑은 고딕" charset="0"/>
+                <a:ea typeface="맑은 고딕" charset="0"/>
+              </a:rPr>
+              <a:t>.</a:t>
+            </a:r>
+            <a:r>
+              <a:rPr sz="2000">
+                <a:latin typeface="맑은 고딕" charset="0"/>
+                <a:ea typeface="맑은 고딕" charset="0"/>
+              </a:rPr>
+              <a:t> </a:t>
+            </a:r>
+            <a:r>
+              <a:rPr lang="ko-KR" sz="1800">
+                <a:latin typeface="맑은 고딕" charset="0"/>
+                <a:ea typeface="맑은 고딕" charset="0"/>
+              </a:rPr>
+              <a:t>마지막으로 StoneMonster의 Observe 스크립트에 Target으로 Sun 오브젝트를 넣어줍니다. </a:t>
+            </a:r>
+            <a:endParaRPr lang="ko-KR" altLang="en-US" sz="1800">
+              <a:latin typeface="맑은 고딕" charset="0"/>
+              <a:ea typeface="맑은 고딕" charset="0"/>
+            </a:endParaRPr>
+          </a:p>
+        </p:txBody>
+      </p:sp>
+      <p:pic>
+        <p:nvPicPr>
+          <p:cNvPr id="12" name="그림 113" descr="C:/Users/Admin1/AppData/Roaming/PolarisOffice/ETemp/5800_7652896/fImage112872242382.png"/>
+          <p:cNvPicPr>
+            <a:picLocks noChangeAspect="1"/>
+          </p:cNvPicPr>
+          <p:nvPr/>
+        </p:nvPicPr>
+        <p:blipFill rotWithShape="1">
+          <a:blip r:embed="rId6" cstate="hqprint">
+            <a:extLst>
+              <a:ext uri="{28A0092B-C50C-407E-A947-70E740481C1C}">
+                <a14:useLocalDpi xmlns:a14="http://schemas.microsoft.com/office/drawing/2010/main"/>
+              </a:ext>
+            </a:extLst>
+          </a:blip>
+          <a:stretch>
+            <a:fillRect/>
+          </a:stretch>
+        </p:blipFill>
+        <p:spPr>
+          <a:xfrm rot="0">
+            <a:off x="6824980" y="3558540"/>
+            <a:ext cx="4034155" cy="1663700"/>
+          </a:xfrm>
+          <a:prstGeom prst="roundRect"/>
+          <a:solidFill>
+            <a:srgbClr val="EDEDED"/>
+          </a:solidFill>
+        </p:spPr>
+      </p:pic>
+      <p:sp>
+        <p:nvSpPr>
+          <p:cNvPr id="14" name="텍스트 상자 119"/>
+          <p:cNvSpPr txBox="1">
+            <a:spLocks/>
+          </p:cNvSpPr>
+          <p:nvPr/>
+        </p:nvSpPr>
+        <p:spPr>
+          <a:xfrm rot="0">
+            <a:off x="6813550" y="5314315"/>
+            <a:ext cx="4045585" cy="954405"/>
+          </a:xfrm>
+          <a:prstGeom prst="rect"/>
+          <a:noFill/>
+          <a:ln w="0">
+            <a:noFill/>
+            <a:prstDash/>
+          </a:ln>
+        </p:spPr>
+        <p:txBody>
+          <a:bodyPr wrap="square" lIns="89535" tIns="46355" rIns="89535" bIns="46355" numCol="1" vert="horz" anchor="t">
+            <a:spAutoFit/>
+          </a:bodyPr>
+          <a:lstStyle/>
+          <a:p>
+            <a:pPr marL="0" indent="0" rtl="0" algn="l" defTabSz="914400" eaLnBrk="1" latinLnBrk="0" hangingPunct="1">
+              <a:buFontTx/>
+              <a:buNone/>
+            </a:pPr>
+            <a:r>
+              <a:rPr lang="ko-KR" sz="2000" b="1">
+                <a:solidFill>
+                  <a:srgbClr val="0611F2"/>
+                </a:solidFill>
+                <a:latin typeface="맑은 고딕" charset="0"/>
+                <a:ea typeface="맑은 고딕" charset="0"/>
+              </a:rPr>
+              <a:t>10</a:t>
+            </a:r>
+            <a:r>
+              <a:rPr sz="2000" b="1">
+                <a:solidFill>
+                  <a:srgbClr val="0611F2"/>
+                </a:solidFill>
+                <a:latin typeface="맑은 고딕" charset="0"/>
+                <a:ea typeface="맑은 고딕" charset="0"/>
+              </a:rPr>
+              <a:t>.</a:t>
+            </a:r>
+            <a:r>
+              <a:rPr sz="2000">
+                <a:latin typeface="맑은 고딕" charset="0"/>
+                <a:ea typeface="맑은 고딕" charset="0"/>
+              </a:rPr>
+              <a:t> </a:t>
+            </a:r>
+            <a:r>
+              <a:rPr lang="ko-KR" sz="1800">
+                <a:latin typeface="맑은 고딕" charset="0"/>
+                <a:ea typeface="맑은 고딕" charset="0"/>
+              </a:rPr>
+              <a:t>그다음 Earth 오브젝트와 Sun 오브젝트의 위치와 크기값을 설정합니다.</a:t>
+            </a:r>
+            <a:endParaRPr lang="ko-KR" altLang="en-US" sz="1800">
+              <a:latin typeface="맑은 고딕" charset="0"/>
+              <a:ea typeface="맑은 고딕" charset="0"/>
+            </a:endParaRPr>
+          </a:p>
+        </p:txBody>
+      </p:sp>
+      <p:pic>
+        <p:nvPicPr>
+          <p:cNvPr id="16" name="그림 4" descr="C:/Users/Admin1/AppData/Roaming/PolarisOffice/ETemp/5800_7652896/fImage1733661538467.png"/>
+          <p:cNvPicPr>
+            <a:picLocks noChangeAspect="1"/>
+          </p:cNvPicPr>
+          <p:nvPr/>
+        </p:nvPicPr>
+        <p:blipFill rotWithShape="1">
+          <a:blip r:embed="rId8" cstate="print">
             <a:extLst>
               <a:ext uri="{28A0092B-C50C-407E-A947-70E740481C1C}">
                 <a14:useLocalDpi xmlns:a14="http://schemas.microsoft.com/office/drawing/2010/main" val="0"/>
@@ -10158,25 +10310,23 @@
         </p:blipFill>
         <p:spPr>
           <a:xfrm rot="0">
-            <a:off x="6816725" y="1280795"/>
-            <a:ext cx="1295400" cy="772160"/>
-          </a:xfrm>
-          <a:prstGeom prst="roundRect"/>
-          <a:solidFill>
-            <a:srgbClr val="EDEDED"/>
-          </a:solidFill>
+            <a:off x="1159510" y="1454785"/>
+            <a:ext cx="4236085" cy="2910205"/>
+          </a:xfrm>
+          <a:prstGeom prst="rect"/>
+          <a:noFill/>
         </p:spPr>
       </p:pic>
       <p:pic>
         <p:nvPicPr>
-          <p:cNvPr id="8" name="그림 107"/>
+          <p:cNvPr id="17" name="그림 10" descr="C:/Users/Admin1/AppData/Roaming/PolarisOffice/ETemp/5800_7652896/fImage52331576334.png"/>
           <p:cNvPicPr>
             <a:picLocks noChangeAspect="1"/>
           </p:cNvPicPr>
           <p:nvPr/>
         </p:nvPicPr>
         <p:blipFill rotWithShape="1">
-          <a:blip r:embed="rId4" cstate="print">
+          <a:blip r:embed="rId9" cstate="print">
             <a:extLst>
               <a:ext uri="{28A0092B-C50C-407E-A947-70E740481C1C}">
                 <a14:useLocalDpi xmlns:a14="http://schemas.microsoft.com/office/drawing/2010/main" val="0"/>
@@ -10189,8 +10339,8 @@
         </p:blipFill>
         <p:spPr>
           <a:xfrm rot="0">
-            <a:off x="8255000" y="1278255"/>
-            <a:ext cx="2538095" cy="767080"/>
+            <a:off x="6826250" y="1445895"/>
+            <a:ext cx="1106170" cy="892810"/>
           </a:xfrm>
           <a:prstGeom prst="roundRect"/>
           <a:solidFill>
@@ -10205,14 +10355,13 @@
           <p:nvPr/>
         </p:nvCxnSpPr>
         <p:spPr>
-          <a:xfrm rot="0">
-            <a:off x="7407275" y="1820545"/>
-            <a:ext cx="3317240" cy="59055"/>
+          <a:xfrm rot="0" flipV="1">
+            <a:off x="7412355" y="2095500"/>
+            <a:ext cx="3369310" cy="165100"/>
           </a:xfrm>
           <a:prstGeom prst="straightConnector1"/>
           <a:ln w="6350" cap="flat" cmpd="sng">
             <a:prstDash/>
-            <a:headEnd type="none" w="med" len="med"/>
             <a:tailEnd type="triangle" w="med" len="med"/>
           </a:ln>
         </p:spPr>
@@ -10231,246 +10380,6 @@
           </a:fontRef>
         </p:style>
       </p:cxnSp>
-      <p:sp>
-        <p:nvSpPr>
-          <p:cNvPr id="10" name="텍스트 상자 111"/>
-          <p:cNvSpPr txBox="1">
-            <a:spLocks/>
-          </p:cNvSpPr>
-          <p:nvPr/>
-        </p:nvSpPr>
-        <p:spPr>
-          <a:xfrm rot="0">
-            <a:off x="6816725" y="2183765"/>
-            <a:ext cx="3975100" cy="955040"/>
-          </a:xfrm>
-          <a:prstGeom prst="rect"/>
-          <a:noFill/>
-          <a:ln w="0">
-            <a:noFill/>
-            <a:prstDash/>
-          </a:ln>
-        </p:spPr>
-        <p:txBody>
-          <a:bodyPr wrap="square" lIns="89535" tIns="46355" rIns="89535" bIns="46355" numCol="1" vert="horz" anchor="t">
-            <a:spAutoFit/>
-          </a:bodyPr>
-          <a:lstStyle/>
-          <a:p>
-            <a:pPr marL="0" indent="0" rtl="0" algn="l" defTabSz="914400" eaLnBrk="1" latinLnBrk="0" hangingPunct="1">
-              <a:buFontTx/>
-              <a:buNone/>
-            </a:pPr>
-            <a:r>
-              <a:rPr lang="ko-KR" sz="2000" b="1">
-                <a:solidFill>
-                  <a:srgbClr val="0611F2"/>
-                </a:solidFill>
-                <a:latin typeface="맑은 고딕" charset="0"/>
-                <a:ea typeface="맑은 고딕" charset="0"/>
-              </a:rPr>
-              <a:t>9</a:t>
-            </a:r>
-            <a:r>
-              <a:rPr sz="2000" b="1">
-                <a:solidFill>
-                  <a:srgbClr val="0611F2"/>
-                </a:solidFill>
-                <a:latin typeface="맑은 고딕" charset="0"/>
-                <a:ea typeface="맑은 고딕" charset="0"/>
-              </a:rPr>
-              <a:t>.</a:t>
-            </a:r>
-            <a:r>
-              <a:rPr sz="2000">
-                <a:latin typeface="맑은 고딕" charset="0"/>
-                <a:ea typeface="맑은 고딕" charset="0"/>
-              </a:rPr>
-              <a:t> </a:t>
-            </a:r>
-            <a:r>
-              <a:rPr lang="ko-KR" sz="1800">
-                <a:latin typeface="맑은 고딕" charset="0"/>
-                <a:ea typeface="맑은 고딕" charset="0"/>
-              </a:rPr>
-              <a:t>마지막으로 StoneMonster의 Observe 스크립트에 Target으로 Sun 오브젝트를 넣어줍니다. </a:t>
-            </a:r>
-            <a:endParaRPr lang="ko-KR" altLang="en-US" sz="1800">
-              <a:latin typeface="맑은 고딕" charset="0"/>
-              <a:ea typeface="맑은 고딕" charset="0"/>
-            </a:endParaRPr>
-          </a:p>
-        </p:txBody>
-      </p:sp>
-      <p:pic>
-        <p:nvPicPr>
-          <p:cNvPr id="11" name="그림 112"/>
-          <p:cNvPicPr>
-            <a:picLocks noChangeAspect="1"/>
-          </p:cNvPicPr>
-          <p:nvPr/>
-        </p:nvPicPr>
-        <p:blipFill rotWithShape="1">
-          <a:blip r:embed="rId5" cstate="print">
-            <a:extLst>
-              <a:ext uri="{28A0092B-C50C-407E-A947-70E740481C1C}">
-                <a14:useLocalDpi xmlns:a14="http://schemas.microsoft.com/office/drawing/2010/main" val="0"/>
-              </a:ext>
-            </a:extLst>
-          </a:blip>
-          <a:stretch>
-            <a:fillRect/>
-          </a:stretch>
-        </p:blipFill>
-        <p:spPr>
-          <a:xfrm rot="0">
-            <a:off x="6816725" y="3255010"/>
-            <a:ext cx="3982720" cy="843915"/>
-          </a:xfrm>
-          <a:prstGeom prst="roundRect"/>
-          <a:solidFill>
-            <a:srgbClr val="EDEDED"/>
-          </a:solidFill>
-        </p:spPr>
-      </p:pic>
-      <p:pic>
-        <p:nvPicPr>
-          <p:cNvPr id="12" name="그림 113"/>
-          <p:cNvPicPr>
-            <a:picLocks noChangeAspect="1"/>
-          </p:cNvPicPr>
-          <p:nvPr/>
-        </p:nvPicPr>
-        <p:blipFill rotWithShape="1">
-          <a:blip r:embed="rId6" cstate="print">
-            <a:extLst>
-              <a:ext uri="{28A0092B-C50C-407E-A947-70E740481C1C}">
-                <a14:useLocalDpi xmlns:a14="http://schemas.microsoft.com/office/drawing/2010/main" val="0"/>
-              </a:ext>
-            </a:extLst>
-          </a:blip>
-          <a:stretch>
-            <a:fillRect/>
-          </a:stretch>
-        </p:blipFill>
-        <p:spPr>
-          <a:xfrm rot="0">
-            <a:off x="6816090" y="4260850"/>
-            <a:ext cx="3982720" cy="943610"/>
-          </a:xfrm>
-          <a:prstGeom prst="roundRect"/>
-          <a:solidFill>
-            <a:srgbClr val="EDEDED"/>
-          </a:solidFill>
-        </p:spPr>
-      </p:pic>
-      <p:sp>
-        <p:nvSpPr>
-          <p:cNvPr id="14" name="텍스트 상자 119"/>
-          <p:cNvSpPr txBox="1">
-            <a:spLocks/>
-          </p:cNvSpPr>
-          <p:nvPr/>
-        </p:nvSpPr>
-        <p:spPr>
-          <a:xfrm>
-            <a:off x="6813550" y="5314315"/>
-            <a:ext cx="3975100" cy="954405"/>
-          </a:xfrm>
-          <a:prstGeom prst="rect"/>
-          <a:noFill/>
-          <a:ln w="0">
-            <a:noFill/>
-            <a:prstDash/>
-          </a:ln>
-        </p:spPr>
-        <p:txBody>
-          <a:bodyPr wrap="square" lIns="89535" tIns="46355" rIns="89535" bIns="46355" numCol="1" vert="horz" anchor="t">
-            <a:spAutoFit/>
-          </a:bodyPr>
-          <a:lstStyle/>
-          <a:p>
-            <a:pPr marL="0" indent="0" rtl="0" algn="l" defTabSz="914400" eaLnBrk="1" latinLnBrk="0" hangingPunct="1">
-              <a:buFontTx/>
-              <a:buNone/>
-            </a:pPr>
-            <a:r>
-              <a:rPr lang="ko-KR" sz="2000" b="1">
-                <a:solidFill>
-                  <a:srgbClr val="0611F2"/>
-                </a:solidFill>
-                <a:latin typeface="맑은 고딕" charset="0"/>
-                <a:ea typeface="맑은 고딕" charset="0"/>
-              </a:rPr>
-              <a:t>10</a:t>
-            </a:r>
-            <a:r>
-              <a:rPr sz="2000" b="1">
-                <a:solidFill>
-                  <a:srgbClr val="0611F2"/>
-                </a:solidFill>
-                <a:latin typeface="맑은 고딕" charset="0"/>
-                <a:ea typeface="맑은 고딕" charset="0"/>
-              </a:rPr>
-              <a:t>.</a:t>
-            </a:r>
-            <a:r>
-              <a:rPr sz="2000">
-                <a:latin typeface="맑은 고딕" charset="0"/>
-                <a:ea typeface="맑은 고딕" charset="0"/>
-              </a:rPr>
-              <a:t> </a:t>
-            </a:r>
-            <a:r>
-              <a:rPr lang="ko-KR" sz="1800">
-                <a:latin typeface="맑은 고딕" charset="0"/>
-                <a:ea typeface="맑은 고딕" charset="0"/>
-              </a:rPr>
-              <a:t>그다음</a:t>
-            </a:r>
-            <a:r>
-              <a:rPr lang="ko-KR" sz="1800">
-                <a:latin typeface="맑은 고딕" charset="0"/>
-                <a:ea typeface="맑은 고딕" charset="0"/>
-              </a:rPr>
-              <a:t> Earth 오브젝트와 Sun 오브젝트의 위치와 크기값을 설정합니다.</a:t>
-            </a:r>
-            <a:endParaRPr lang="ko-KR" altLang="en-US" sz="1800">
-              <a:latin typeface="맑은 고딕" charset="0"/>
-              <a:ea typeface="맑은 고딕" charset="0"/>
-            </a:endParaRPr>
-          </a:p>
-        </p:txBody>
-      </p:sp>
-      <p:pic>
-        <p:nvPicPr>
-          <p:cNvPr id="15" name="그림 120"/>
-          <p:cNvPicPr>
-            <a:picLocks noChangeAspect="1"/>
-          </p:cNvPicPr>
-          <p:nvPr/>
-        </p:nvPicPr>
-        <p:blipFill rotWithShape="1">
-          <a:blip r:embed="rId7" cstate="print">
-            <a:extLst>
-              <a:ext uri="{28A0092B-C50C-407E-A947-70E740481C1C}">
-                <a14:useLocalDpi xmlns:a14="http://schemas.microsoft.com/office/drawing/2010/main" val="0"/>
-              </a:ext>
-            </a:extLst>
-          </a:blip>
-          <a:stretch>
-            <a:fillRect/>
-          </a:stretch>
-        </p:blipFill>
-        <p:spPr>
-          <a:xfrm rot="0">
-            <a:off x="1163955" y="2161540"/>
-            <a:ext cx="4231640" cy="2934970"/>
-          </a:xfrm>
-          <a:prstGeom prst="rect"/>
-          <a:noFill/>
-        </p:spPr>
-      </p:pic>
     </p:spTree>
   </p:cSld>
   <p:clrMapOvr>
@@ -10522,7 +10431,7 @@
         <p:spPr>
           <a:xfrm rot="0">
             <a:off x="4344670" y="386715"/>
-            <a:ext cx="3503295" cy="554990"/>
+            <a:ext cx="3579495" cy="554990"/>
           </a:xfrm>
           <a:prstGeom prst="rect"/>
           <a:noFill/>
@@ -10549,7 +10458,7 @@
                 <a:latin typeface="맑은 고딕" charset="0"/>
                 <a:ea typeface="맑은 고딕" charset="0"/>
               </a:rPr>
-              <a:t>다섯</a:t>
+              <a:t>여</a:t>
             </a:r>
             <a:r>
               <a:rPr lang="ko-KR" sz="3000" b="1">
@@ -10559,7 +10468,7 @@
                 <a:latin typeface="맑은 고딕" charset="0"/>
                 <a:ea typeface="맑은 고딕" charset="0"/>
               </a:rPr>
-              <a:t> 번째 튜토리얼</a:t>
+              <a:t>섯 번째 튜토리얼</a:t>
             </a:r>
             <a:endParaRPr lang="ko-KR" altLang="en-US" sz="3000" b="1">
               <a:solidFill>
@@ -11156,9 +11065,9 @@
           <p:nvPr/>
         </p:nvSpPr>
         <p:spPr>
-          <a:xfrm rot="0">
+          <a:xfrm>
             <a:off x="4344670" y="386715"/>
-            <a:ext cx="3503930" cy="554990"/>
+            <a:ext cx="3504565" cy="554990"/>
           </a:xfrm>
           <a:prstGeom prst="rect"/>
           <a:noFill/>
@@ -11185,7 +11094,7 @@
                 <a:latin typeface="맑은 고딕" charset="0"/>
                 <a:ea typeface="맑은 고딕" charset="0"/>
               </a:rPr>
-              <a:t>여</a:t>
+              <a:t>일곱</a:t>
             </a:r>
             <a:r>
               <a:rPr lang="ko-KR" sz="3000" b="1">
@@ -11195,7 +11104,7 @@
                 <a:latin typeface="맑은 고딕" charset="0"/>
                 <a:ea typeface="맑은 고딕" charset="0"/>
               </a:rPr>
-              <a:t>섯 번째 튜토리얼</a:t>
+              <a:t> 번째 튜토리얼</a:t>
             </a:r>
             <a:endParaRPr lang="ko-KR" altLang="en-US" sz="3000" b="1">
               <a:solidFill>
@@ -11333,7 +11242,7 @@
         <p:spPr>
           <a:xfrm rot="0">
             <a:off x="6830695" y="5255260"/>
-            <a:ext cx="4102100" cy="954405"/>
+            <a:ext cx="3977005" cy="954405"/>
           </a:xfrm>
           <a:prstGeom prst="rect"/>
           <a:noFill/>
@@ -11360,17 +11269,7 @@
                 <a:latin typeface="맑은 고딕" charset="0"/>
                 <a:ea typeface="맑은 고딕" charset="0"/>
               </a:rPr>
-              <a:t>1</a:t>
-            </a:r>
-            <a:r>
-              <a:rPr lang="ko-KR" sz="2000" b="1">
-                <a:solidFill>
-                  <a:srgbClr val="0611F2"/>
-                </a:solidFill>
-                <a:latin typeface="맑은 고딕" charset="0"/>
-                <a:ea typeface="맑은 고딕" charset="0"/>
-              </a:rPr>
-              <a:t>5</a:t>
+              <a:t>15</a:t>
             </a:r>
             <a:r>
               <a:rPr sz="2000" b="1">
@@ -11394,14 +11293,7 @@
                 <a:latin typeface="맑은 고딕" charset="0"/>
                 <a:ea typeface="맑은 고딕" charset="0"/>
               </a:rPr>
-              <a:t>그리고 Project 폴더에 있는 Render Texture 폴더에 Render Texture를 생성합니다.</a:t>
-            </a:r>
-            <a:r>
-              <a:rPr lang="ko-KR" sz="1800">
-                <a:latin typeface="맑은 고딕" charset="0"/>
-                <a:ea typeface="맑은 고딕" charset="0"/>
-              </a:rPr>
-              <a:t> </a:t>
+              <a:t>그리고 Project 폴더에 있는 Render Texture 폴더에 Render Texture를 생성합니다. </a:t>
             </a:r>
             <a:endParaRPr lang="ko-KR" altLang="en-US" sz="1800">
               <a:latin typeface="맑은 고딕" charset="0"/>
@@ -11443,17 +11335,17 @@
       </p:pic>
       <p:pic>
         <p:nvPicPr>
-          <p:cNvPr id="38" name="그림 7"/>
+          <p:cNvPr id="38" name="그림 7" descr="C:/Users/Admin1/AppData/Roaming/PolarisOffice/ETemp/5800_7652896/fImage421642018467.png"/>
           <p:cNvPicPr>
             <a:picLocks noChangeAspect="1"/>
           </p:cNvPicPr>
           <p:nvPr/>
         </p:nvPicPr>
         <p:blipFill rotWithShape="1">
-          <a:blip r:embed="rId3" cstate="print">
+          <a:blip r:embed="rId3" cstate="hqprint">
             <a:extLst>
               <a:ext uri="{28A0092B-C50C-407E-A947-70E740481C1C}">
-                <a14:useLocalDpi xmlns:a14="http://schemas.microsoft.com/office/drawing/2010/main" val="0"/>
+                <a14:useLocalDpi xmlns:a14="http://schemas.microsoft.com/office/drawing/2010/main"/>
               </a:ext>
             </a:extLst>
           </a:blip>
@@ -11464,7 +11356,7 @@
         <p:spPr>
           <a:xfrm rot="0">
             <a:off x="6832600" y="1297305"/>
-            <a:ext cx="4095750" cy="2894330"/>
+            <a:ext cx="3966210" cy="2894965"/>
           </a:xfrm>
           <a:prstGeom prst="roundRect"/>
           <a:solidFill>
@@ -11474,17 +11366,17 @@
       </p:pic>
       <p:pic>
         <p:nvPicPr>
-          <p:cNvPr id="39" name="그림 10"/>
+          <p:cNvPr id="39" name="그림 10" descr="C:/Users/Admin1/AppData/Roaming/PolarisOffice/ETemp/5800_7652896/fImage40062026334.png"/>
           <p:cNvPicPr>
             <a:picLocks noChangeAspect="1"/>
           </p:cNvPicPr>
           <p:nvPr/>
         </p:nvPicPr>
         <p:blipFill rotWithShape="1">
-          <a:blip r:embed="rId4" cstate="print">
+          <a:blip r:embed="rId4" cstate="hqprint">
             <a:extLst>
               <a:ext uri="{28A0092B-C50C-407E-A947-70E740481C1C}">
-                <a14:useLocalDpi xmlns:a14="http://schemas.microsoft.com/office/drawing/2010/main" val="0"/>
+                <a14:useLocalDpi xmlns:a14="http://schemas.microsoft.com/office/drawing/2010/main"/>
               </a:ext>
             </a:extLst>
           </a:blip>
@@ -11494,8 +11386,8 @@
         </p:blipFill>
         <p:spPr>
           <a:xfrm rot="0">
-            <a:off x="6832600" y="4338320"/>
-            <a:ext cx="4087495" cy="897255"/>
+            <a:off x="6832600" y="4304030"/>
+            <a:ext cx="3966210" cy="897890"/>
           </a:xfrm>
           <a:prstGeom prst="roundRect"/>
           <a:solidFill>

</xml_diff>

<commit_message>
Camera Shake Function Added
- Updating each PPT Data

- Using coroutines to implement
  shaking by utilizing the local
  position value of the camera for a
  certain period of time

- Adding and deleting resource data
</commit_message>
<xml_diff>
--- a/Assets/Class/Rotation/PPT Data/Rotation Example.pptx
+++ b/Assets/Class/Rotation/PPT Data/Rotation Example.pptx
@@ -2,14 +2,14 @@
 <file path=ppt/presentation.xml><?xml version="1.0" encoding="utf-8"?>
 <p:presentation xmlns:a="http://schemas.openxmlformats.org/drawingml/2006/main" xmlns:r="http://schemas.openxmlformats.org/officeDocument/2006/relationships" xmlns:p="http://schemas.openxmlformats.org/presentationml/2006/main" xmlns:p14="http://schemas.microsoft.com/office/powerpoint/2010/main" saveSubsetFonts="1" firstSlideNum="0">
   <p:sldMasterIdLst>
-    <p:sldMasterId id="2147485410" r:id="rId12"/>
+    <p:sldMasterId id="2147485411" r:id="rId12"/>
   </p:sldMasterIdLst>
   <p:notesMasterIdLst>
     <p:notesMasterId r:id="rId14"/>
   </p:notesMasterIdLst>
   <p:sldIdLst>
-    <p:sldId id="279" r:id="rId16"/>
-    <p:sldId id="276" r:id="rId17"/>
+    <p:sldId id="276" r:id="rId16"/>
+    <p:sldId id="279" r:id="rId17"/>
     <p:sldId id="280" r:id="rId18"/>
     <p:sldId id="281" r:id="rId19"/>
     <p:sldId id="282" r:id="rId20"/>
@@ -5382,7 +5382,7 @@
       </p:grpSpPr>
       <p:sp>
         <p:nvSpPr>
-          <p:cNvPr id="2" name="텍스트 상자 21"/>
+          <p:cNvPr id="2" name="텍스트 상자 1"/>
           <p:cNvSpPr txBox="1">
             <a:spLocks/>
           </p:cNvSpPr>
@@ -5390,8 +5390,8 @@
         </p:nvSpPr>
         <p:spPr>
           <a:xfrm rot="0">
-            <a:off x="5226685" y="421005"/>
-            <a:ext cx="1744345" cy="555625"/>
+            <a:off x="4519295" y="386715"/>
+            <a:ext cx="3146425" cy="554990"/>
           </a:xfrm>
           <a:prstGeom prst="rect"/>
           <a:noFill/>
@@ -5401,7 +5401,7 @@
           </a:ln>
         </p:spPr>
         <p:txBody>
-          <a:bodyPr wrap="square" lIns="89535" tIns="46355" rIns="89535" bIns="46355" vert="horz" anchor="t">
+          <a:bodyPr wrap="square" lIns="89535" tIns="46355" rIns="89535" bIns="46355" numCol="1" vert="horz" anchor="t">
             <a:spAutoFit/>
           </a:bodyPr>
           <a:lstStyle/>
@@ -5411,14 +5411,54 @@
               <a:buNone/>
             </a:pPr>
             <a:r>
-              <a:rPr sz="3000" b="1">
+              <a:rPr lang="ko-KR" sz="3000" b="1">
                 <a:solidFill>
                   <a:schemeClr val="tx1"/>
                 </a:solidFill>
                 <a:latin typeface="맑은 고딕" charset="0"/>
                 <a:ea typeface="맑은 고딕" charset="0"/>
               </a:rPr>
-              <a:t>Rotation</a:t>
+              <a:t>첫</a:t>
+            </a:r>
+            <a:r>
+              <a:rPr lang="ko-KR" sz="3000" b="1">
+                <a:solidFill>
+                  <a:schemeClr val="tx1"/>
+                </a:solidFill>
+                <a:latin typeface="맑은 고딕" charset="0"/>
+                <a:ea typeface="맑은 고딕" charset="0"/>
+              </a:rPr>
+              <a:t> </a:t>
+            </a:r>
+            <a:r>
+              <a:rPr lang="ko-KR" sz="3000" b="1">
+                <a:solidFill>
+                  <a:schemeClr val="tx1"/>
+                </a:solidFill>
+                <a:latin typeface="맑은 고딕" charset="0"/>
+                <a:ea typeface="맑은 고딕" charset="0"/>
+              </a:rPr>
+              <a:t>번째</a:t>
+            </a:r>
+            <a:r>
+              <a:rPr lang="ko-KR" sz="3000" b="1">
+                <a:solidFill>
+                  <a:schemeClr val="tx1"/>
+                </a:solidFill>
+                <a:latin typeface="맑은 고딕" charset="0"/>
+                <a:ea typeface="맑은 고딕" charset="0"/>
+              </a:rPr>
+              <a:t> </a:t>
+            </a:r>
+            <a:r>
+              <a:rPr lang="ko-KR" sz="3000" b="1">
+                <a:solidFill>
+                  <a:schemeClr val="tx1"/>
+                </a:solidFill>
+                <a:latin typeface="맑은 고딕" charset="0"/>
+                <a:ea typeface="맑은 고딕" charset="0"/>
+              </a:rPr>
+              <a:t>튜토리얼</a:t>
             </a:r>
             <a:endParaRPr lang="ko-KR" altLang="en-US" sz="3000" b="1">
               <a:solidFill>
@@ -5432,7 +5472,7 @@
       </p:sp>
       <p:sp>
         <p:nvSpPr>
-          <p:cNvPr id="3" name="텍스트 상자 22"/>
+          <p:cNvPr id="10" name="텍스트 상자 13"/>
           <p:cNvSpPr txBox="1">
             <a:spLocks/>
           </p:cNvSpPr>
@@ -5440,8 +5480,8 @@
         </p:nvSpPr>
         <p:spPr>
           <a:xfrm rot="0">
-            <a:off x="984250" y="1197610"/>
-            <a:ext cx="4404995" cy="924560"/>
+            <a:off x="1438275" y="2687955"/>
+            <a:ext cx="3924935" cy="955040"/>
           </a:xfrm>
           <a:prstGeom prst="rect"/>
           <a:noFill/>
@@ -5451,7 +5491,7 @@
           </a:ln>
         </p:spPr>
         <p:txBody>
-          <a:bodyPr wrap="square" lIns="89535" tIns="46355" rIns="89535" bIns="46355" vert="horz" anchor="t">
+          <a:bodyPr wrap="square" lIns="89535" tIns="46355" rIns="89535" bIns="46355" numCol="1" vert="horz" anchor="t">
             <a:spAutoFit/>
           </a:bodyPr>
           <a:lstStyle/>
@@ -5461,11 +5501,31 @@
               <a:buNone/>
             </a:pPr>
             <a:r>
-              <a:rPr sz="1800">
-                <a:latin typeface="맑은 고딕" charset="0"/>
-                <a:ea typeface="맑은 고딕" charset="0"/>
-              </a:rPr>
-              <a:t>유니티는 오일러 각을 이용하여 회전을 직관적으로 조작할 수 있도록 인스펙터 뷰에서 표시하고 있습니다. </a:t>
+              <a:rPr sz="2000" b="1">
+                <a:solidFill>
+                  <a:srgbClr val="0611F2"/>
+                </a:solidFill>
+                <a:latin typeface="맑은 고딕" charset="0"/>
+                <a:ea typeface="맑은 고딕" charset="0"/>
+              </a:rPr>
+              <a:t>1.</a:t>
+            </a:r>
+            <a:r>
+              <a:rPr lang="ko-KR" sz="2000" b="1">
+                <a:solidFill>
+                  <a:srgbClr val="0611F2"/>
+                </a:solidFill>
+                <a:latin typeface="맑은 고딕" charset="0"/>
+                <a:ea typeface="맑은 고딕" charset="0"/>
+              </a:rPr>
+              <a:t> </a:t>
+            </a:r>
+            <a:r>
+              <a:rPr lang="ko-KR" sz="1800">
+                <a:latin typeface="맑은 고딕" charset="0"/>
+                <a:ea typeface="맑은 고딕" charset="0"/>
+              </a:rPr>
+              <a:t>첫 번째로 Main Camera를 선택하고 위치와 회전 값을 설정합니다.</a:t>
             </a:r>
             <a:endParaRPr lang="ko-KR" altLang="en-US" sz="1800">
               <a:latin typeface="맑은 고딕" charset="0"/>
@@ -5476,7 +5536,7 @@
       </p:sp>
       <p:sp>
         <p:nvSpPr>
-          <p:cNvPr id="4" name="텍스트 상자 23"/>
+          <p:cNvPr id="20" name="텍스트 상자 18"/>
           <p:cNvSpPr txBox="1">
             <a:spLocks/>
           </p:cNvSpPr>
@@ -5484,8 +5544,8 @@
         </p:nvSpPr>
         <p:spPr>
           <a:xfrm rot="0">
-            <a:off x="981710" y="4239260"/>
-            <a:ext cx="4406900" cy="1755775"/>
+            <a:off x="6816725" y="2673985"/>
+            <a:ext cx="4149090" cy="954405"/>
           </a:xfrm>
           <a:prstGeom prst="rect"/>
           <a:noFill/>
@@ -5505,49 +5565,59 @@
               <a:buNone/>
             </a:pPr>
             <a:r>
-              <a:rPr sz="1800">
-                <a:latin typeface="맑은 고딕" charset="0"/>
-                <a:ea typeface="맑은 고딕" charset="0"/>
-              </a:rPr>
-              <a:t>하지만, 오일러 각으로 회전시키게 되면 짐벌락 현상이 발생할 수 있습니다.</a:t>
+              <a:rPr lang="ko-KR" sz="2000" b="1">
+                <a:solidFill>
+                  <a:srgbClr val="0611F2"/>
+                </a:solidFill>
+                <a:latin typeface="맑은 고딕" charset="0"/>
+                <a:ea typeface="맑은 고딕" charset="0"/>
+              </a:rPr>
+              <a:t>3</a:t>
+            </a:r>
+            <a:r>
+              <a:rPr sz="2000" b="1">
+                <a:solidFill>
+                  <a:srgbClr val="0611F2"/>
+                </a:solidFill>
+                <a:latin typeface="맑은 고딕" charset="0"/>
+                <a:ea typeface="맑은 고딕" charset="0"/>
+              </a:rPr>
+              <a:t>.</a:t>
+            </a:r>
+            <a:r>
+              <a:rPr lang="ko-KR" sz="2000" b="1">
+                <a:solidFill>
+                  <a:srgbClr val="0611F2"/>
+                </a:solidFill>
+                <a:latin typeface="맑은 고딕" charset="0"/>
+                <a:ea typeface="맑은 고딕" charset="0"/>
+              </a:rPr>
+              <a:t> </a:t>
+            </a:r>
+            <a:r>
+              <a:rPr lang="ko-KR" sz="1800">
+                <a:latin typeface="맑은 고딕" charset="0"/>
+                <a:ea typeface="맑은 고딕" charset="0"/>
+              </a:rPr>
+              <a:t>그런 다음 </a:t>
+            </a:r>
+            <a:r>
+              <a:rPr lang="ko-KR" sz="1800">
+                <a:latin typeface="맑은 고딕" charset="0"/>
+                <a:ea typeface="맑은 고딕" charset="0"/>
+              </a:rPr>
+              <a:t>StoneMonster 오브젝트의 위치와 회전값을 설정합니다.</a:t>
             </a:r>
             <a:endParaRPr lang="ko-KR" altLang="en-US" sz="1800">
               <a:latin typeface="맑은 고딕" charset="0"/>
               <a:ea typeface="맑은 고딕" charset="0"/>
             </a:endParaRPr>
           </a:p>
-          <a:p>
-            <a:pPr marL="0" indent="0" rtl="0" algn="l" defTabSz="914400" eaLnBrk="1" latinLnBrk="0" hangingPunct="1">
-              <a:buFontTx/>
-              <a:buNone/>
-            </a:pPr>
-            <a:endParaRPr lang="ko-KR" altLang="en-US" sz="1800">
-              <a:latin typeface="맑은 고딕" charset="0"/>
-              <a:ea typeface="맑은 고딕" charset="0"/>
-            </a:endParaRPr>
-          </a:p>
-          <a:p>
-            <a:pPr marL="0" indent="0" rtl="0" algn="l" defTabSz="914400" eaLnBrk="1" latinLnBrk="0" hangingPunct="1">
-              <a:buFontTx/>
-              <a:buNone/>
-            </a:pPr>
-            <a:r>
-              <a:rPr sz="1800">
-                <a:latin typeface="맑은 고딕" charset="0"/>
-                <a:ea typeface="맑은 고딕" charset="0"/>
-              </a:rPr>
-              <a:t>짐벌락 현상은 특정 축이 회전했을 때 나머지 두 축이 겹쳐져서 한 축의 역할이 사라지는 현상입니다.</a:t>
-            </a:r>
-            <a:endParaRPr lang="ko-KR" altLang="en-US" sz="1800">
-              <a:latin typeface="맑은 고딕" charset="0"/>
-              <a:ea typeface="맑은 고딕" charset="0"/>
-            </a:endParaRPr>
-          </a:p>
         </p:txBody>
       </p:sp>
       <p:sp>
         <p:nvSpPr>
-          <p:cNvPr id="5" name="텍스트 상자 24"/>
+          <p:cNvPr id="34" name="텍스트 상자 26"/>
           <p:cNvSpPr txBox="1">
             <a:spLocks/>
           </p:cNvSpPr>
@@ -5555,8 +5625,8 @@
         </p:nvSpPr>
         <p:spPr>
           <a:xfrm rot="0">
-            <a:off x="6863715" y="1200785"/>
-            <a:ext cx="4417695" cy="647065"/>
+            <a:off x="1435100" y="5120640"/>
+            <a:ext cx="3924935" cy="954405"/>
           </a:xfrm>
           <a:prstGeom prst="rect"/>
           <a:noFill/>
@@ -5576,11 +5646,52 @@
               <a:buNone/>
             </a:pPr>
             <a:r>
-              <a:rPr sz="1800">
-                <a:latin typeface="맑은 고딕" charset="0"/>
-                <a:ea typeface="맑은 고딕" charset="0"/>
-              </a:rPr>
-              <a:t>짐벌락 현상에 대한 문제 해결하기 위해 회전에 대한 값은 쿼터니언을 사용합니다.</a:t>
+              <a:rPr sz="2000" b="1">
+                <a:solidFill>
+                  <a:srgbClr val="0611F2"/>
+                </a:solidFill>
+                <a:latin typeface="맑은 고딕" charset="0"/>
+                <a:ea typeface="맑은 고딕" charset="0"/>
+              </a:rPr>
+              <a:t>2.</a:t>
+            </a:r>
+            <a:r>
+              <a:rPr lang="ko-KR" sz="2000" b="1">
+                <a:solidFill>
+                  <a:srgbClr val="0611F2"/>
+                </a:solidFill>
+                <a:latin typeface="맑은 고딕" charset="0"/>
+                <a:ea typeface="맑은 고딕" charset="0"/>
+              </a:rPr>
+              <a:t> </a:t>
+            </a:r>
+            <a:r>
+              <a:rPr lang="ko-KR" sz="1800">
+                <a:latin typeface="맑은 고딕" charset="0"/>
+                <a:ea typeface="맑은 고딕" charset="0"/>
+              </a:rPr>
+              <a:t>그</a:t>
+            </a:r>
+            <a:r>
+              <a:rPr lang="ko-KR" sz="1800">
+                <a:latin typeface="맑은 고딕" charset="0"/>
+                <a:ea typeface="맑은 고딕" charset="0"/>
+              </a:rPr>
+              <a:t>리고</a:t>
+            </a:r>
+            <a:r>
+              <a:rPr lang="ko-KR" sz="1800">
+                <a:latin typeface="맑은 고딕" charset="0"/>
+                <a:ea typeface="맑은 고딕" charset="0"/>
+              </a:rPr>
+              <a:t> </a:t>
+            </a:r>
+            <a:r>
+              <a:rPr lang="ko-KR" sz="1800">
+                <a:latin typeface="맑은 고딕" charset="0"/>
+                <a:ea typeface="맑은 고딕" charset="0"/>
+              </a:rPr>
+              <a:t>Project 폴더에서 Model에 StoneMonster 모델을 선택하고 게임 월드 공간에 배치합니다.</a:t>
             </a:r>
             <a:endParaRPr lang="ko-KR" altLang="en-US" sz="1800">
               <a:latin typeface="맑은 고딕" charset="0"/>
@@ -5591,17 +5702,17 @@
       </p:sp>
       <p:pic>
         <p:nvPicPr>
-          <p:cNvPr id="6" name="그림 25"/>
+          <p:cNvPr id="35" name="그림 5"/>
           <p:cNvPicPr>
             <a:picLocks noChangeAspect="1"/>
           </p:cNvPicPr>
           <p:nvPr/>
         </p:nvPicPr>
         <p:blipFill rotWithShape="1">
-          <a:blip r:embed="rId2" cstate="hqprint">
+          <a:blip r:embed="rId24" cstate="print">
             <a:extLst>
               <a:ext uri="{28A0092B-C50C-407E-A947-70E740481C1C}">
-                <a14:useLocalDpi xmlns:a14="http://schemas.microsoft.com/office/drawing/2010/main"/>
+                <a14:useLocalDpi xmlns:a14="http://schemas.microsoft.com/office/drawing/2010/main" val="0"/>
               </a:ext>
             </a:extLst>
           </a:blip>
@@ -5611,8 +5722,8 @@
         </p:blipFill>
         <p:spPr>
           <a:xfrm rot="0">
-            <a:off x="977265" y="2259965"/>
-            <a:ext cx="4407535" cy="1811655"/>
+            <a:off x="1436370" y="1562735"/>
+            <a:ext cx="1099820" cy="756920"/>
           </a:xfrm>
           <a:prstGeom prst="roundRect"/>
           <a:solidFill>
@@ -5622,17 +5733,17 @@
       </p:pic>
       <p:pic>
         <p:nvPicPr>
-          <p:cNvPr id="7" name="그림 26"/>
+          <p:cNvPr id="36" name="그림 8"/>
           <p:cNvPicPr>
             <a:picLocks noChangeAspect="1"/>
           </p:cNvPicPr>
           <p:nvPr/>
         </p:nvPicPr>
         <p:blipFill rotWithShape="1">
-          <a:blip r:embed="rId3" cstate="hqprint">
+          <a:blip r:embed="rId25" cstate="print">
             <a:extLst>
               <a:ext uri="{28A0092B-C50C-407E-A947-70E740481C1C}">
-                <a14:useLocalDpi xmlns:a14="http://schemas.microsoft.com/office/drawing/2010/main"/>
+                <a14:useLocalDpi xmlns:a14="http://schemas.microsoft.com/office/drawing/2010/main" val="0"/>
               </a:ext>
             </a:extLst>
           </a:blip>
@@ -5642,8 +5753,8 @@
         </p:blipFill>
         <p:spPr>
           <a:xfrm rot="0">
-            <a:off x="6903085" y="2106295"/>
-            <a:ext cx="1950720" cy="1576705"/>
+            <a:off x="2693670" y="1296670"/>
+            <a:ext cx="2677160" cy="1280795"/>
           </a:xfrm>
           <a:prstGeom prst="roundRect"/>
           <a:solidFill>
@@ -5653,17 +5764,17 @@
       </p:pic>
       <p:pic>
         <p:nvPicPr>
-          <p:cNvPr id="8" name="그림 27"/>
+          <p:cNvPr id="37" name="그림 11"/>
           <p:cNvPicPr>
             <a:picLocks noChangeAspect="1"/>
           </p:cNvPicPr>
           <p:nvPr/>
         </p:nvPicPr>
         <p:blipFill rotWithShape="1">
-          <a:blip r:embed="rId4" cstate="hqprint">
+          <a:blip r:embed="rId26" cstate="print">
             <a:extLst>
               <a:ext uri="{28A0092B-C50C-407E-A947-70E740481C1C}">
-                <a14:useLocalDpi xmlns:a14="http://schemas.microsoft.com/office/drawing/2010/main"/>
+                <a14:useLocalDpi xmlns:a14="http://schemas.microsoft.com/office/drawing/2010/main" val="0"/>
               </a:ext>
             </a:extLst>
           </a:blip>
@@ -5673,8 +5784,8 @@
         </p:blipFill>
         <p:spPr>
           <a:xfrm rot="0">
-            <a:off x="9319260" y="2094865"/>
-            <a:ext cx="1962150" cy="1588135"/>
+            <a:off x="2976245" y="3851275"/>
+            <a:ext cx="2390140" cy="1136015"/>
           </a:xfrm>
           <a:prstGeom prst="roundRect"/>
           <a:solidFill>
@@ -5682,9 +5793,199 @@
           </a:solidFill>
         </p:spPr>
       </p:pic>
+      <p:pic>
+        <p:nvPicPr>
+          <p:cNvPr id="38" name="그림 15"/>
+          <p:cNvPicPr>
+            <a:picLocks noChangeAspect="1"/>
+          </p:cNvPicPr>
+          <p:nvPr/>
+        </p:nvPicPr>
+        <p:blipFill rotWithShape="1">
+          <a:blip r:embed="rId27" cstate="print">
+            <a:extLst>
+              <a:ext uri="{28A0092B-C50C-407E-A947-70E740481C1C}">
+                <a14:useLocalDpi xmlns:a14="http://schemas.microsoft.com/office/drawing/2010/main" val="0"/>
+              </a:ext>
+            </a:extLst>
+          </a:blip>
+          <a:stretch>
+            <a:fillRect/>
+          </a:stretch>
+        </p:blipFill>
+        <p:spPr>
+          <a:xfrm rot="0">
+            <a:off x="1442720" y="4088765"/>
+            <a:ext cx="1210310" cy="782320"/>
+          </a:xfrm>
+          <a:prstGeom prst="roundRect"/>
+          <a:solidFill>
+            <a:srgbClr val="EDEDED"/>
+          </a:solidFill>
+        </p:spPr>
+      </p:pic>
+      <p:cxnSp>
+        <p:nvCxnSpPr>
+          <p:cNvPr id="39" name="도형 18"/>
+          <p:cNvCxnSpPr/>
+          <p:nvPr/>
+        </p:nvCxnSpPr>
+        <p:spPr>
+          <a:xfrm rot="0" flipH="1">
+            <a:off x="2535555" y="4479925"/>
+            <a:ext cx="557530" cy="224790"/>
+          </a:xfrm>
+          <a:prstGeom prst="straightConnector1"/>
+          <a:ln w="6350" cap="flat" cmpd="sng">
+            <a:prstDash/>
+            <a:headEnd type="none" w="med" len="med"/>
+            <a:tailEnd type="triangle" w="med" len="med"/>
+          </a:ln>
+        </p:spPr>
+        <p:style>
+          <a:lnRef idx="1">
+            <a:schemeClr val="accent1"/>
+          </a:lnRef>
+          <a:fillRef idx="0">
+            <a:schemeClr val="accent1"/>
+          </a:fillRef>
+          <a:effectRef idx="0">
+            <a:schemeClr val="accent1"/>
+          </a:effectRef>
+          <a:fontRef idx="minor">
+            <a:schemeClr val="tx1"/>
+          </a:fontRef>
+        </p:style>
+      </p:cxnSp>
+      <p:pic>
+        <p:nvPicPr>
+          <p:cNvPr id="40" name="그림 19"/>
+          <p:cNvPicPr>
+            <a:picLocks noChangeAspect="1"/>
+          </p:cNvPicPr>
+          <p:nvPr/>
+        </p:nvPicPr>
+        <p:blipFill rotWithShape="1">
+          <a:blip r:embed="rId28" cstate="print">
+            <a:extLst>
+              <a:ext uri="{28A0092B-C50C-407E-A947-70E740481C1C}">
+                <a14:useLocalDpi xmlns:a14="http://schemas.microsoft.com/office/drawing/2010/main" val="0"/>
+              </a:ext>
+            </a:extLst>
+          </a:blip>
+          <a:stretch>
+            <a:fillRect/>
+          </a:stretch>
+        </p:blipFill>
+        <p:spPr>
+          <a:xfrm rot="0">
+            <a:off x="6816725" y="1297305"/>
+            <a:ext cx="4149090" cy="1280160"/>
+          </a:xfrm>
+          <a:prstGeom prst="roundRect"/>
+          <a:solidFill>
+            <a:srgbClr val="EDEDED"/>
+          </a:solidFill>
+        </p:spPr>
+      </p:pic>
+      <p:pic>
+        <p:nvPicPr>
+          <p:cNvPr id="41" name="그림 22"/>
+          <p:cNvPicPr>
+            <a:picLocks noChangeAspect="1"/>
+          </p:cNvPicPr>
+          <p:nvPr/>
+        </p:nvPicPr>
+        <p:blipFill rotWithShape="1">
+          <a:blip r:embed="rId29" cstate="print">
+            <a:extLst>
+              <a:ext uri="{28A0092B-C50C-407E-A947-70E740481C1C}">
+                <a14:useLocalDpi xmlns:a14="http://schemas.microsoft.com/office/drawing/2010/main" val="0"/>
+              </a:ext>
+            </a:extLst>
+          </a:blip>
+          <a:stretch>
+            <a:fillRect/>
+          </a:stretch>
+        </p:blipFill>
+        <p:spPr>
+          <a:xfrm rot="0">
+            <a:off x="6821170" y="3807460"/>
+            <a:ext cx="2432050" cy="1197610"/>
+          </a:xfrm>
+          <a:prstGeom prst="roundRect"/>
+          <a:solidFill>
+            <a:srgbClr val="EDEDED"/>
+          </a:solidFill>
+        </p:spPr>
+      </p:pic>
+      <p:pic>
+        <p:nvPicPr>
+          <p:cNvPr id="42" name="그림 26"/>
+          <p:cNvPicPr>
+            <a:picLocks noChangeAspect="1"/>
+          </p:cNvPicPr>
+          <p:nvPr/>
+        </p:nvPicPr>
+        <p:blipFill rotWithShape="1">
+          <a:blip r:embed="rId30" cstate="print">
+            <a:extLst>
+              <a:ext uri="{28A0092B-C50C-407E-A947-70E740481C1C}">
+                <a14:useLocalDpi xmlns:a14="http://schemas.microsoft.com/office/drawing/2010/main" val="0"/>
+              </a:ext>
+            </a:extLst>
+          </a:blip>
+          <a:stretch>
+            <a:fillRect/>
+          </a:stretch>
+        </p:blipFill>
+        <p:spPr>
+          <a:xfrm rot="0">
+            <a:off x="10166985" y="4014470"/>
+            <a:ext cx="795655" cy="774065"/>
+          </a:xfrm>
+          <a:prstGeom prst="roundRect"/>
+          <a:solidFill>
+            <a:srgbClr val="EDEDED"/>
+          </a:solidFill>
+        </p:spPr>
+      </p:pic>
+      <p:cxnSp>
+        <p:nvCxnSpPr>
+          <p:cNvPr id="43" name="도형 29"/>
+          <p:cNvCxnSpPr/>
+          <p:nvPr/>
+        </p:nvCxnSpPr>
+        <p:spPr>
+          <a:xfrm rot="0" flipH="1">
+            <a:off x="8961755" y="4401185"/>
+            <a:ext cx="1205865" cy="346075"/>
+          </a:xfrm>
+          <a:prstGeom prst="straightConnector1"/>
+          <a:ln w="6350" cap="flat" cmpd="sng">
+            <a:prstDash/>
+            <a:headEnd type="none" w="med" len="med"/>
+            <a:tailEnd type="triangle" w="med" len="med"/>
+          </a:ln>
+        </p:spPr>
+        <p:style>
+          <a:lnRef idx="1">
+            <a:schemeClr val="accent1"/>
+          </a:lnRef>
+          <a:fillRef idx="0">
+            <a:schemeClr val="accent1"/>
+          </a:fillRef>
+          <a:effectRef idx="0">
+            <a:schemeClr val="accent1"/>
+          </a:effectRef>
+          <a:fontRef idx="minor">
+            <a:schemeClr val="tx1"/>
+          </a:fontRef>
+        </p:style>
+      </p:cxnSp>
       <p:sp>
         <p:nvSpPr>
-          <p:cNvPr id="9" name="텍스트 상자 28"/>
+          <p:cNvPr id="44" name="텍스트 상자 30"/>
           <p:cNvSpPr txBox="1">
             <a:spLocks/>
           </p:cNvSpPr>
@@ -5692,8 +5993,8 @@
         </p:nvSpPr>
         <p:spPr>
           <a:xfrm rot="0">
-            <a:off x="6866890" y="3959860"/>
-            <a:ext cx="4422775" cy="2031365"/>
+            <a:off x="6813550" y="5131435"/>
+            <a:ext cx="4160520" cy="954405"/>
           </a:xfrm>
           <a:prstGeom prst="rect"/>
           <a:noFill/>
@@ -5713,62 +6014,62 @@
               <a:buNone/>
             </a:pPr>
             <a:r>
-              <a:rPr sz="1800">
-                <a:latin typeface="맑은 고딕" charset="0"/>
-                <a:ea typeface="맑은 고딕" charset="0"/>
-              </a:rPr>
-              <a:t>쿼터니언은 3개의 축을 동시에 회전시킬 수 있</a:t>
+              <a:rPr lang="ko-KR" sz="2000" b="1">
+                <a:solidFill>
+                  <a:srgbClr val="0611F2"/>
+                </a:solidFill>
+                <a:latin typeface="맑은 고딕" charset="0"/>
+                <a:ea typeface="맑은 고딕" charset="0"/>
+              </a:rPr>
+              <a:t>4</a:t>
+            </a:r>
+            <a:r>
+              <a:rPr sz="2000" b="1">
+                <a:solidFill>
+                  <a:srgbClr val="0611F2"/>
+                </a:solidFill>
+                <a:latin typeface="맑은 고딕" charset="0"/>
+                <a:ea typeface="맑은 고딕" charset="0"/>
+              </a:rPr>
+              <a:t>.</a:t>
+            </a:r>
+            <a:r>
+              <a:rPr lang="ko-KR" sz="2000" b="1">
+                <a:solidFill>
+                  <a:srgbClr val="0611F2"/>
+                </a:solidFill>
+                <a:latin typeface="맑은 고딕" charset="0"/>
+                <a:ea typeface="맑은 고딕" charset="0"/>
+              </a:rPr>
+              <a:t> </a:t>
             </a:r>
             <a:r>
               <a:rPr lang="ko-KR" sz="1800">
                 <a:latin typeface="맑은 고딕" charset="0"/>
                 <a:ea typeface="맑은 고딕" charset="0"/>
               </a:rPr>
-              <a:t>어 짐벌락에 대한 문제점을 해결할 수 있습니다.</a:t>
-            </a:r>
-            <a:endParaRPr lang="ko-KR" altLang="en-US" sz="1800">
-              <a:latin typeface="맑은 고딕" charset="0"/>
-              <a:ea typeface="맑은 고딕" charset="0"/>
-            </a:endParaRPr>
-          </a:p>
-          <a:p>
-            <a:pPr marL="0" indent="0" rtl="0" algn="l" defTabSz="914400" eaLnBrk="1" latinLnBrk="0" hangingPunct="1">
-              <a:buFontTx/>
-              <a:buNone/>
-            </a:pPr>
-            <a:endParaRPr lang="ko-KR" altLang="en-US" sz="1800">
-              <a:latin typeface="맑은 고딕" charset="0"/>
-              <a:ea typeface="맑은 고딕" charset="0"/>
-            </a:endParaRPr>
-          </a:p>
-          <a:p>
-            <a:pPr marL="0" indent="0" rtl="0" algn="l" defTabSz="914400" eaLnBrk="1" latinLnBrk="0" hangingPunct="1">
-              <a:buFontTx/>
-              <a:buNone/>
-            </a:pPr>
-            <a:r>
-              <a:rPr sz="1800">
-                <a:latin typeface="맑은 고딕" charset="0"/>
-                <a:ea typeface="맑은 고딕" charset="0"/>
-              </a:rPr>
-              <a:t>하지만, 하나의 방향에서 다른 방향으로 측정되기에 180</a:t>
-            </a:r>
-            <a:r>
-              <a:rPr sz="1800" i="0" b="0">
-                <a:solidFill>
-                  <a:srgbClr val="202124"/>
-                </a:solidFill>
-                <a:latin typeface="맑은 고딕" charset="0"/>
-                <a:ea typeface="맑은 고딕" charset="0"/>
-              </a:rPr>
-              <a:t>°</a:t>
-            </a:r>
-            <a:r>
-              <a:rPr sz="1800">
-                <a:latin typeface="맑은 고딕" charset="0"/>
-                <a:ea typeface="맑은 고딕" charset="0"/>
-              </a:rPr>
-              <a:t>보다 큰 회전은 표현할 수 없습니다.</a:t>
+              <a:t>그</a:t>
+            </a:r>
+            <a:r>
+              <a:rPr lang="ko-KR" sz="1800">
+                <a:latin typeface="맑은 고딕" charset="0"/>
+                <a:ea typeface="맑은 고딕" charset="0"/>
+              </a:rPr>
+              <a:t>다음</a:t>
+            </a:r>
+            <a:r>
+              <a:rPr lang="ko-KR" sz="1800">
+                <a:latin typeface="맑은 고딕" charset="0"/>
+                <a:ea typeface="맑은 고딕" charset="0"/>
+              </a:rPr>
+              <a:t> </a:t>
+            </a:r>
+            <a:r>
+              <a:rPr lang="ko-KR" sz="1800">
+                <a:latin typeface="맑은 고딕" charset="0"/>
+                <a:ea typeface="맑은 고딕" charset="0"/>
+              </a:rPr>
+              <a:t>Observe라는 스크립트를 생성하고 StoneMonster 오브젝트에 넣어줍니다.</a:t>
             </a:r>
             <a:endParaRPr lang="ko-KR" altLang="en-US" sz="1800">
               <a:latin typeface="맑은 고딕" charset="0"/>
@@ -7130,7 +7431,7 @@
       </p:grpSpPr>
       <p:sp>
         <p:nvSpPr>
-          <p:cNvPr id="2" name="텍스트 상자 1"/>
+          <p:cNvPr id="2" name="텍스트 상자 21"/>
           <p:cNvSpPr txBox="1">
             <a:spLocks/>
           </p:cNvSpPr>
@@ -7138,8 +7439,8 @@
         </p:nvSpPr>
         <p:spPr>
           <a:xfrm rot="0">
-            <a:off x="4519295" y="386715"/>
-            <a:ext cx="3146425" cy="554990"/>
+            <a:off x="5226685" y="421005"/>
+            <a:ext cx="1744345" cy="555625"/>
           </a:xfrm>
           <a:prstGeom prst="rect"/>
           <a:noFill/>
@@ -7149,7 +7450,7 @@
           </a:ln>
         </p:spPr>
         <p:txBody>
-          <a:bodyPr wrap="square" lIns="89535" tIns="46355" rIns="89535" bIns="46355" numCol="1" vert="horz" anchor="t">
+          <a:bodyPr wrap="square" lIns="89535" tIns="46355" rIns="89535" bIns="46355" vert="horz" anchor="t">
             <a:spAutoFit/>
           </a:bodyPr>
           <a:lstStyle/>
@@ -7159,54 +7460,14 @@
               <a:buNone/>
             </a:pPr>
             <a:r>
-              <a:rPr lang="ko-KR" sz="3000" b="1">
+              <a:rPr sz="3000" b="1">
                 <a:solidFill>
                   <a:schemeClr val="tx1"/>
                 </a:solidFill>
                 <a:latin typeface="맑은 고딕" charset="0"/>
                 <a:ea typeface="맑은 고딕" charset="0"/>
               </a:rPr>
-              <a:t>첫</a:t>
-            </a:r>
-            <a:r>
-              <a:rPr lang="ko-KR" sz="3000" b="1">
-                <a:solidFill>
-                  <a:schemeClr val="tx1"/>
-                </a:solidFill>
-                <a:latin typeface="맑은 고딕" charset="0"/>
-                <a:ea typeface="맑은 고딕" charset="0"/>
-              </a:rPr>
-              <a:t> </a:t>
-            </a:r>
-            <a:r>
-              <a:rPr lang="ko-KR" sz="3000" b="1">
-                <a:solidFill>
-                  <a:schemeClr val="tx1"/>
-                </a:solidFill>
-                <a:latin typeface="맑은 고딕" charset="0"/>
-                <a:ea typeface="맑은 고딕" charset="0"/>
-              </a:rPr>
-              <a:t>번째</a:t>
-            </a:r>
-            <a:r>
-              <a:rPr lang="ko-KR" sz="3000" b="1">
-                <a:solidFill>
-                  <a:schemeClr val="tx1"/>
-                </a:solidFill>
-                <a:latin typeface="맑은 고딕" charset="0"/>
-                <a:ea typeface="맑은 고딕" charset="0"/>
-              </a:rPr>
-              <a:t> </a:t>
-            </a:r>
-            <a:r>
-              <a:rPr lang="ko-KR" sz="3000" b="1">
-                <a:solidFill>
-                  <a:schemeClr val="tx1"/>
-                </a:solidFill>
-                <a:latin typeface="맑은 고딕" charset="0"/>
-                <a:ea typeface="맑은 고딕" charset="0"/>
-              </a:rPr>
-              <a:t>튜토리얼</a:t>
+              <a:t>Rotation</a:t>
             </a:r>
             <a:endParaRPr lang="ko-KR" altLang="en-US" sz="3000" b="1">
               <a:solidFill>
@@ -7220,7 +7481,7 @@
       </p:sp>
       <p:sp>
         <p:nvSpPr>
-          <p:cNvPr id="10" name="텍스트 상자 13"/>
+          <p:cNvPr id="3" name="텍스트 상자 22"/>
           <p:cNvSpPr txBox="1">
             <a:spLocks/>
           </p:cNvSpPr>
@@ -7228,8 +7489,8 @@
         </p:nvSpPr>
         <p:spPr>
           <a:xfrm rot="0">
-            <a:off x="1438275" y="2687955"/>
-            <a:ext cx="3924935" cy="955040"/>
+            <a:off x="984250" y="1197610"/>
+            <a:ext cx="4404995" cy="924560"/>
           </a:xfrm>
           <a:prstGeom prst="rect"/>
           <a:noFill/>
@@ -7239,7 +7500,7 @@
           </a:ln>
         </p:spPr>
         <p:txBody>
-          <a:bodyPr wrap="square" lIns="89535" tIns="46355" rIns="89535" bIns="46355" numCol="1" vert="horz" anchor="t">
+          <a:bodyPr wrap="square" lIns="89535" tIns="46355" rIns="89535" bIns="46355" vert="horz" anchor="t">
             <a:spAutoFit/>
           </a:bodyPr>
           <a:lstStyle/>
@@ -7249,31 +7510,11 @@
               <a:buNone/>
             </a:pPr>
             <a:r>
-              <a:rPr sz="2000" b="1">
-                <a:solidFill>
-                  <a:srgbClr val="0611F2"/>
-                </a:solidFill>
-                <a:latin typeface="맑은 고딕" charset="0"/>
-                <a:ea typeface="맑은 고딕" charset="0"/>
-              </a:rPr>
-              <a:t>1.</a:t>
-            </a:r>
-            <a:r>
-              <a:rPr lang="ko-KR" sz="2000" b="1">
-                <a:solidFill>
-                  <a:srgbClr val="0611F2"/>
-                </a:solidFill>
-                <a:latin typeface="맑은 고딕" charset="0"/>
-                <a:ea typeface="맑은 고딕" charset="0"/>
-              </a:rPr>
-              <a:t> </a:t>
-            </a:r>
-            <a:r>
-              <a:rPr lang="ko-KR" sz="1800">
-                <a:latin typeface="맑은 고딕" charset="0"/>
-                <a:ea typeface="맑은 고딕" charset="0"/>
-              </a:rPr>
-              <a:t>첫 번째로 Main Camera를 선택하고 위치와 회전 값을 설정합니다.</a:t>
+              <a:rPr sz="1800">
+                <a:latin typeface="맑은 고딕" charset="0"/>
+                <a:ea typeface="맑은 고딕" charset="0"/>
+              </a:rPr>
+              <a:t>유니티는 오일러 각을 이용하여 회전을 직관적으로 조작할 수 있도록 인스펙터 뷰에서 표시하고 있습니다. </a:t>
             </a:r>
             <a:endParaRPr lang="ko-KR" altLang="en-US" sz="1800">
               <a:latin typeface="맑은 고딕" charset="0"/>
@@ -7284,7 +7525,7 @@
       </p:sp>
       <p:sp>
         <p:nvSpPr>
-          <p:cNvPr id="20" name="텍스트 상자 18"/>
+          <p:cNvPr id="4" name="텍스트 상자 23"/>
           <p:cNvSpPr txBox="1">
             <a:spLocks/>
           </p:cNvSpPr>
@@ -7292,8 +7533,8 @@
         </p:nvSpPr>
         <p:spPr>
           <a:xfrm rot="0">
-            <a:off x="6816725" y="2673985"/>
-            <a:ext cx="4149090" cy="954405"/>
+            <a:off x="981710" y="4239260"/>
+            <a:ext cx="4406900" cy="1755775"/>
           </a:xfrm>
           <a:prstGeom prst="rect"/>
           <a:noFill/>
@@ -7313,59 +7554,49 @@
               <a:buNone/>
             </a:pPr>
             <a:r>
-              <a:rPr lang="ko-KR" sz="2000" b="1">
-                <a:solidFill>
-                  <a:srgbClr val="0611F2"/>
-                </a:solidFill>
-                <a:latin typeface="맑은 고딕" charset="0"/>
-                <a:ea typeface="맑은 고딕" charset="0"/>
-              </a:rPr>
-              <a:t>3</a:t>
-            </a:r>
-            <a:r>
-              <a:rPr sz="2000" b="1">
-                <a:solidFill>
-                  <a:srgbClr val="0611F2"/>
-                </a:solidFill>
-                <a:latin typeface="맑은 고딕" charset="0"/>
-                <a:ea typeface="맑은 고딕" charset="0"/>
-              </a:rPr>
-              <a:t>.</a:t>
-            </a:r>
-            <a:r>
-              <a:rPr lang="ko-KR" sz="2000" b="1">
-                <a:solidFill>
-                  <a:srgbClr val="0611F2"/>
-                </a:solidFill>
-                <a:latin typeface="맑은 고딕" charset="0"/>
-                <a:ea typeface="맑은 고딕" charset="0"/>
-              </a:rPr>
-              <a:t> </a:t>
-            </a:r>
-            <a:r>
-              <a:rPr lang="ko-KR" sz="1800">
-                <a:latin typeface="맑은 고딕" charset="0"/>
-                <a:ea typeface="맑은 고딕" charset="0"/>
-              </a:rPr>
-              <a:t>그런 다음 </a:t>
-            </a:r>
-            <a:r>
-              <a:rPr lang="ko-KR" sz="1800">
-                <a:latin typeface="맑은 고딕" charset="0"/>
-                <a:ea typeface="맑은 고딕" charset="0"/>
-              </a:rPr>
-              <a:t>StoneMonster 오브젝트의 위치와 회전값을 설정합니다.</a:t>
+              <a:rPr sz="1800">
+                <a:latin typeface="맑은 고딕" charset="0"/>
+                <a:ea typeface="맑은 고딕" charset="0"/>
+              </a:rPr>
+              <a:t>하지만, 오일러 각으로 회전시키게 되면 짐벌락 현상이 발생할 수 있습니다.</a:t>
             </a:r>
             <a:endParaRPr lang="ko-KR" altLang="en-US" sz="1800">
               <a:latin typeface="맑은 고딕" charset="0"/>
               <a:ea typeface="맑은 고딕" charset="0"/>
             </a:endParaRPr>
           </a:p>
+          <a:p>
+            <a:pPr marL="0" indent="0" rtl="0" algn="l" defTabSz="914400" eaLnBrk="1" latinLnBrk="0" hangingPunct="1">
+              <a:buFontTx/>
+              <a:buNone/>
+            </a:pPr>
+            <a:endParaRPr lang="ko-KR" altLang="en-US" sz="1800">
+              <a:latin typeface="맑은 고딕" charset="0"/>
+              <a:ea typeface="맑은 고딕" charset="0"/>
+            </a:endParaRPr>
+          </a:p>
+          <a:p>
+            <a:pPr marL="0" indent="0" rtl="0" algn="l" defTabSz="914400" eaLnBrk="1" latinLnBrk="0" hangingPunct="1">
+              <a:buFontTx/>
+              <a:buNone/>
+            </a:pPr>
+            <a:r>
+              <a:rPr sz="1800">
+                <a:latin typeface="맑은 고딕" charset="0"/>
+                <a:ea typeface="맑은 고딕" charset="0"/>
+              </a:rPr>
+              <a:t>짐벌락 현상은 특정 축이 회전했을 때 나머지 두 축이 겹쳐져서 한 축의 역할이 사라지는 현상입니다.</a:t>
+            </a:r>
+            <a:endParaRPr lang="ko-KR" altLang="en-US" sz="1800">
+              <a:latin typeface="맑은 고딕" charset="0"/>
+              <a:ea typeface="맑은 고딕" charset="0"/>
+            </a:endParaRPr>
+          </a:p>
         </p:txBody>
       </p:sp>
       <p:sp>
         <p:nvSpPr>
-          <p:cNvPr id="34" name="텍스트 상자 26"/>
+          <p:cNvPr id="5" name="텍스트 상자 24"/>
           <p:cNvSpPr txBox="1">
             <a:spLocks/>
           </p:cNvSpPr>
@@ -7373,8 +7604,8 @@
         </p:nvSpPr>
         <p:spPr>
           <a:xfrm rot="0">
-            <a:off x="1435100" y="5120640"/>
-            <a:ext cx="3924935" cy="954405"/>
+            <a:off x="6863715" y="1200785"/>
+            <a:ext cx="4417695" cy="647065"/>
           </a:xfrm>
           <a:prstGeom prst="rect"/>
           <a:noFill/>
@@ -7394,52 +7625,11 @@
               <a:buNone/>
             </a:pPr>
             <a:r>
-              <a:rPr sz="2000" b="1">
-                <a:solidFill>
-                  <a:srgbClr val="0611F2"/>
-                </a:solidFill>
-                <a:latin typeface="맑은 고딕" charset="0"/>
-                <a:ea typeface="맑은 고딕" charset="0"/>
-              </a:rPr>
-              <a:t>2.</a:t>
-            </a:r>
-            <a:r>
-              <a:rPr lang="ko-KR" sz="2000" b="1">
-                <a:solidFill>
-                  <a:srgbClr val="0611F2"/>
-                </a:solidFill>
-                <a:latin typeface="맑은 고딕" charset="0"/>
-                <a:ea typeface="맑은 고딕" charset="0"/>
-              </a:rPr>
-              <a:t> </a:t>
-            </a:r>
-            <a:r>
-              <a:rPr lang="ko-KR" sz="1800">
-                <a:latin typeface="맑은 고딕" charset="0"/>
-                <a:ea typeface="맑은 고딕" charset="0"/>
-              </a:rPr>
-              <a:t>그</a:t>
-            </a:r>
-            <a:r>
-              <a:rPr lang="ko-KR" sz="1800">
-                <a:latin typeface="맑은 고딕" charset="0"/>
-                <a:ea typeface="맑은 고딕" charset="0"/>
-              </a:rPr>
-              <a:t>리고</a:t>
-            </a:r>
-            <a:r>
-              <a:rPr lang="ko-KR" sz="1800">
-                <a:latin typeface="맑은 고딕" charset="0"/>
-                <a:ea typeface="맑은 고딕" charset="0"/>
-              </a:rPr>
-              <a:t> </a:t>
-            </a:r>
-            <a:r>
-              <a:rPr lang="ko-KR" sz="1800">
-                <a:latin typeface="맑은 고딕" charset="0"/>
-                <a:ea typeface="맑은 고딕" charset="0"/>
-              </a:rPr>
-              <a:t>Project 폴더에서 Model에 StoneMonster 모델을 선택하고 게임 월드 공간에 배치합니다.</a:t>
+              <a:rPr sz="1800">
+                <a:latin typeface="맑은 고딕" charset="0"/>
+                <a:ea typeface="맑은 고딕" charset="0"/>
+              </a:rPr>
+              <a:t>짐벌락 현상에 대한 문제 해결하기 위해 회전에 대한 값은 쿼터니언을 사용합니다.</a:t>
             </a:r>
             <a:endParaRPr lang="ko-KR" altLang="en-US" sz="1800">
               <a:latin typeface="맑은 고딕" charset="0"/>
@@ -7450,17 +7640,17 @@
       </p:sp>
       <p:pic>
         <p:nvPicPr>
-          <p:cNvPr id="35" name="그림 5"/>
+          <p:cNvPr id="6" name="그림 25"/>
           <p:cNvPicPr>
             <a:picLocks noChangeAspect="1"/>
           </p:cNvPicPr>
           <p:nvPr/>
         </p:nvPicPr>
         <p:blipFill rotWithShape="1">
-          <a:blip r:embed="rId24" cstate="print">
+          <a:blip r:embed="rId2" cstate="hqprint">
             <a:extLst>
               <a:ext uri="{28A0092B-C50C-407E-A947-70E740481C1C}">
-                <a14:useLocalDpi xmlns:a14="http://schemas.microsoft.com/office/drawing/2010/main" val="0"/>
+                <a14:useLocalDpi xmlns:a14="http://schemas.microsoft.com/office/drawing/2010/main"/>
               </a:ext>
             </a:extLst>
           </a:blip>
@@ -7470,8 +7660,8 @@
         </p:blipFill>
         <p:spPr>
           <a:xfrm rot="0">
-            <a:off x="1436370" y="1562735"/>
-            <a:ext cx="1099820" cy="756920"/>
+            <a:off x="977265" y="2259965"/>
+            <a:ext cx="4407535" cy="1811655"/>
           </a:xfrm>
           <a:prstGeom prst="roundRect"/>
           <a:solidFill>
@@ -7481,17 +7671,17 @@
       </p:pic>
       <p:pic>
         <p:nvPicPr>
-          <p:cNvPr id="36" name="그림 8"/>
+          <p:cNvPr id="7" name="그림 26"/>
           <p:cNvPicPr>
             <a:picLocks noChangeAspect="1"/>
           </p:cNvPicPr>
           <p:nvPr/>
         </p:nvPicPr>
         <p:blipFill rotWithShape="1">
-          <a:blip r:embed="rId25" cstate="print">
+          <a:blip r:embed="rId3" cstate="hqprint">
             <a:extLst>
               <a:ext uri="{28A0092B-C50C-407E-A947-70E740481C1C}">
-                <a14:useLocalDpi xmlns:a14="http://schemas.microsoft.com/office/drawing/2010/main" val="0"/>
+                <a14:useLocalDpi xmlns:a14="http://schemas.microsoft.com/office/drawing/2010/main"/>
               </a:ext>
             </a:extLst>
           </a:blip>
@@ -7501,8 +7691,8 @@
         </p:blipFill>
         <p:spPr>
           <a:xfrm rot="0">
-            <a:off x="2693670" y="1296670"/>
-            <a:ext cx="2677160" cy="1280795"/>
+            <a:off x="6903085" y="2106295"/>
+            <a:ext cx="1950720" cy="1576705"/>
           </a:xfrm>
           <a:prstGeom prst="roundRect"/>
           <a:solidFill>
@@ -7512,17 +7702,17 @@
       </p:pic>
       <p:pic>
         <p:nvPicPr>
-          <p:cNvPr id="37" name="그림 11"/>
+          <p:cNvPr id="8" name="그림 27"/>
           <p:cNvPicPr>
             <a:picLocks noChangeAspect="1"/>
           </p:cNvPicPr>
           <p:nvPr/>
         </p:nvPicPr>
         <p:blipFill rotWithShape="1">
-          <a:blip r:embed="rId26" cstate="print">
+          <a:blip r:embed="rId4" cstate="hqprint">
             <a:extLst>
               <a:ext uri="{28A0092B-C50C-407E-A947-70E740481C1C}">
-                <a14:useLocalDpi xmlns:a14="http://schemas.microsoft.com/office/drawing/2010/main" val="0"/>
+                <a14:useLocalDpi xmlns:a14="http://schemas.microsoft.com/office/drawing/2010/main"/>
               </a:ext>
             </a:extLst>
           </a:blip>
@@ -7532,8 +7722,8 @@
         </p:blipFill>
         <p:spPr>
           <a:xfrm rot="0">
-            <a:off x="2976245" y="3851275"/>
-            <a:ext cx="2390140" cy="1136015"/>
+            <a:off x="9319260" y="2094865"/>
+            <a:ext cx="1962150" cy="1588135"/>
           </a:xfrm>
           <a:prstGeom prst="roundRect"/>
           <a:solidFill>
@@ -7541,199 +7731,9 @@
           </a:solidFill>
         </p:spPr>
       </p:pic>
-      <p:pic>
-        <p:nvPicPr>
-          <p:cNvPr id="38" name="그림 15"/>
-          <p:cNvPicPr>
-            <a:picLocks noChangeAspect="1"/>
-          </p:cNvPicPr>
-          <p:nvPr/>
-        </p:nvPicPr>
-        <p:blipFill rotWithShape="1">
-          <a:blip r:embed="rId27" cstate="print">
-            <a:extLst>
-              <a:ext uri="{28A0092B-C50C-407E-A947-70E740481C1C}">
-                <a14:useLocalDpi xmlns:a14="http://schemas.microsoft.com/office/drawing/2010/main" val="0"/>
-              </a:ext>
-            </a:extLst>
-          </a:blip>
-          <a:stretch>
-            <a:fillRect/>
-          </a:stretch>
-        </p:blipFill>
-        <p:spPr>
-          <a:xfrm rot="0">
-            <a:off x="1442720" y="4088765"/>
-            <a:ext cx="1210310" cy="782320"/>
-          </a:xfrm>
-          <a:prstGeom prst="roundRect"/>
-          <a:solidFill>
-            <a:srgbClr val="EDEDED"/>
-          </a:solidFill>
-        </p:spPr>
-      </p:pic>
-      <p:cxnSp>
-        <p:nvCxnSpPr>
-          <p:cNvPr id="39" name="도형 18"/>
-          <p:cNvCxnSpPr/>
-          <p:nvPr/>
-        </p:nvCxnSpPr>
-        <p:spPr>
-          <a:xfrm rot="0" flipH="1">
-            <a:off x="2535555" y="4479925"/>
-            <a:ext cx="557530" cy="224790"/>
-          </a:xfrm>
-          <a:prstGeom prst="straightConnector1"/>
-          <a:ln w="6350" cap="flat" cmpd="sng">
-            <a:prstDash/>
-            <a:headEnd type="none" w="med" len="med"/>
-            <a:tailEnd type="triangle" w="med" len="med"/>
-          </a:ln>
-        </p:spPr>
-        <p:style>
-          <a:lnRef idx="1">
-            <a:schemeClr val="accent1"/>
-          </a:lnRef>
-          <a:fillRef idx="0">
-            <a:schemeClr val="accent1"/>
-          </a:fillRef>
-          <a:effectRef idx="0">
-            <a:schemeClr val="accent1"/>
-          </a:effectRef>
-          <a:fontRef idx="minor">
-            <a:schemeClr val="tx1"/>
-          </a:fontRef>
-        </p:style>
-      </p:cxnSp>
-      <p:pic>
-        <p:nvPicPr>
-          <p:cNvPr id="40" name="그림 19"/>
-          <p:cNvPicPr>
-            <a:picLocks noChangeAspect="1"/>
-          </p:cNvPicPr>
-          <p:nvPr/>
-        </p:nvPicPr>
-        <p:blipFill rotWithShape="1">
-          <a:blip r:embed="rId28" cstate="print">
-            <a:extLst>
-              <a:ext uri="{28A0092B-C50C-407E-A947-70E740481C1C}">
-                <a14:useLocalDpi xmlns:a14="http://schemas.microsoft.com/office/drawing/2010/main" val="0"/>
-              </a:ext>
-            </a:extLst>
-          </a:blip>
-          <a:stretch>
-            <a:fillRect/>
-          </a:stretch>
-        </p:blipFill>
-        <p:spPr>
-          <a:xfrm rot="0">
-            <a:off x="6816725" y="1297305"/>
-            <a:ext cx="4149090" cy="1280160"/>
-          </a:xfrm>
-          <a:prstGeom prst="roundRect"/>
-          <a:solidFill>
-            <a:srgbClr val="EDEDED"/>
-          </a:solidFill>
-        </p:spPr>
-      </p:pic>
-      <p:pic>
-        <p:nvPicPr>
-          <p:cNvPr id="41" name="그림 22"/>
-          <p:cNvPicPr>
-            <a:picLocks noChangeAspect="1"/>
-          </p:cNvPicPr>
-          <p:nvPr/>
-        </p:nvPicPr>
-        <p:blipFill rotWithShape="1">
-          <a:blip r:embed="rId29" cstate="print">
-            <a:extLst>
-              <a:ext uri="{28A0092B-C50C-407E-A947-70E740481C1C}">
-                <a14:useLocalDpi xmlns:a14="http://schemas.microsoft.com/office/drawing/2010/main" val="0"/>
-              </a:ext>
-            </a:extLst>
-          </a:blip>
-          <a:stretch>
-            <a:fillRect/>
-          </a:stretch>
-        </p:blipFill>
-        <p:spPr>
-          <a:xfrm rot="0">
-            <a:off x="6821170" y="3807460"/>
-            <a:ext cx="2432050" cy="1197610"/>
-          </a:xfrm>
-          <a:prstGeom prst="roundRect"/>
-          <a:solidFill>
-            <a:srgbClr val="EDEDED"/>
-          </a:solidFill>
-        </p:spPr>
-      </p:pic>
-      <p:pic>
-        <p:nvPicPr>
-          <p:cNvPr id="42" name="그림 26"/>
-          <p:cNvPicPr>
-            <a:picLocks noChangeAspect="1"/>
-          </p:cNvPicPr>
-          <p:nvPr/>
-        </p:nvPicPr>
-        <p:blipFill rotWithShape="1">
-          <a:blip r:embed="rId30" cstate="print">
-            <a:extLst>
-              <a:ext uri="{28A0092B-C50C-407E-A947-70E740481C1C}">
-                <a14:useLocalDpi xmlns:a14="http://schemas.microsoft.com/office/drawing/2010/main" val="0"/>
-              </a:ext>
-            </a:extLst>
-          </a:blip>
-          <a:stretch>
-            <a:fillRect/>
-          </a:stretch>
-        </p:blipFill>
-        <p:spPr>
-          <a:xfrm rot="0">
-            <a:off x="10166985" y="4014470"/>
-            <a:ext cx="795655" cy="774065"/>
-          </a:xfrm>
-          <a:prstGeom prst="roundRect"/>
-          <a:solidFill>
-            <a:srgbClr val="EDEDED"/>
-          </a:solidFill>
-        </p:spPr>
-      </p:pic>
-      <p:cxnSp>
-        <p:nvCxnSpPr>
-          <p:cNvPr id="43" name="도형 29"/>
-          <p:cNvCxnSpPr/>
-          <p:nvPr/>
-        </p:nvCxnSpPr>
-        <p:spPr>
-          <a:xfrm rot="0" flipH="1">
-            <a:off x="8961755" y="4401185"/>
-            <a:ext cx="1205865" cy="346075"/>
-          </a:xfrm>
-          <a:prstGeom prst="straightConnector1"/>
-          <a:ln w="6350" cap="flat" cmpd="sng">
-            <a:prstDash/>
-            <a:headEnd type="none" w="med" len="med"/>
-            <a:tailEnd type="triangle" w="med" len="med"/>
-          </a:ln>
-        </p:spPr>
-        <p:style>
-          <a:lnRef idx="1">
-            <a:schemeClr val="accent1"/>
-          </a:lnRef>
-          <a:fillRef idx="0">
-            <a:schemeClr val="accent1"/>
-          </a:fillRef>
-          <a:effectRef idx="0">
-            <a:schemeClr val="accent1"/>
-          </a:effectRef>
-          <a:fontRef idx="minor">
-            <a:schemeClr val="tx1"/>
-          </a:fontRef>
-        </p:style>
-      </p:cxnSp>
       <p:sp>
         <p:nvSpPr>
-          <p:cNvPr id="44" name="텍스트 상자 30"/>
+          <p:cNvPr id="9" name="텍스트 상자 28"/>
           <p:cNvSpPr txBox="1">
             <a:spLocks/>
           </p:cNvSpPr>
@@ -7741,8 +7741,8 @@
         </p:nvSpPr>
         <p:spPr>
           <a:xfrm rot="0">
-            <a:off x="6813550" y="5131435"/>
-            <a:ext cx="4160520" cy="954405"/>
+            <a:off x="6866890" y="3959860"/>
+            <a:ext cx="4422775" cy="2031365"/>
           </a:xfrm>
           <a:prstGeom prst="rect"/>
           <a:noFill/>
@@ -7762,62 +7762,62 @@
               <a:buNone/>
             </a:pPr>
             <a:r>
-              <a:rPr lang="ko-KR" sz="2000" b="1">
+              <a:rPr sz="1800">
+                <a:latin typeface="맑은 고딕" charset="0"/>
+                <a:ea typeface="맑은 고딕" charset="0"/>
+              </a:rPr>
+              <a:t>쿼터니언은 3개의 축을 동시에 회전시킬 수 있</a:t>
+            </a:r>
+            <a:r>
+              <a:rPr lang="ko-KR" sz="1800">
+                <a:latin typeface="맑은 고딕" charset="0"/>
+                <a:ea typeface="맑은 고딕" charset="0"/>
+              </a:rPr>
+              <a:t>어 짐벌락에 대한 문제점을 해결할 수 있습니다.</a:t>
+            </a:r>
+            <a:endParaRPr lang="ko-KR" altLang="en-US" sz="1800">
+              <a:latin typeface="맑은 고딕" charset="0"/>
+              <a:ea typeface="맑은 고딕" charset="0"/>
+            </a:endParaRPr>
+          </a:p>
+          <a:p>
+            <a:pPr marL="0" indent="0" rtl="0" algn="l" defTabSz="914400" eaLnBrk="1" latinLnBrk="0" hangingPunct="1">
+              <a:buFontTx/>
+              <a:buNone/>
+            </a:pPr>
+            <a:endParaRPr lang="ko-KR" altLang="en-US" sz="1800">
+              <a:latin typeface="맑은 고딕" charset="0"/>
+              <a:ea typeface="맑은 고딕" charset="0"/>
+            </a:endParaRPr>
+          </a:p>
+          <a:p>
+            <a:pPr marL="0" indent="0" rtl="0" algn="l" defTabSz="914400" eaLnBrk="1" latinLnBrk="0" hangingPunct="1">
+              <a:buFontTx/>
+              <a:buNone/>
+            </a:pPr>
+            <a:r>
+              <a:rPr sz="1800">
+                <a:latin typeface="맑은 고딕" charset="0"/>
+                <a:ea typeface="맑은 고딕" charset="0"/>
+              </a:rPr>
+              <a:t>하지만, 하나의 방향에서 다른 방향으로 측정되기에 180</a:t>
+            </a:r>
+            <a:r>
+              <a:rPr sz="1800" i="0" b="0">
                 <a:solidFill>
-                  <a:srgbClr val="0611F2"/>
+                  <a:srgbClr val="202124"/>
                 </a:solidFill>
                 <a:latin typeface="맑은 고딕" charset="0"/>
                 <a:ea typeface="맑은 고딕" charset="0"/>
               </a:rPr>
-              <a:t>4</a:t>
-            </a:r>
-            <a:r>
-              <a:rPr sz="2000" b="1">
-                <a:solidFill>
-                  <a:srgbClr val="0611F2"/>
-                </a:solidFill>
-                <a:latin typeface="맑은 고딕" charset="0"/>
-                <a:ea typeface="맑은 고딕" charset="0"/>
-              </a:rPr>
-              <a:t>.</a:t>
-            </a:r>
-            <a:r>
-              <a:rPr lang="ko-KR" sz="2000" b="1">
-                <a:solidFill>
-                  <a:srgbClr val="0611F2"/>
-                </a:solidFill>
-                <a:latin typeface="맑은 고딕" charset="0"/>
-                <a:ea typeface="맑은 고딕" charset="0"/>
-              </a:rPr>
-              <a:t> </a:t>
-            </a:r>
-            <a:r>
-              <a:rPr lang="ko-KR" sz="1800">
-                <a:latin typeface="맑은 고딕" charset="0"/>
-                <a:ea typeface="맑은 고딕" charset="0"/>
-              </a:rPr>
-              <a:t>그</a:t>
-            </a:r>
-            <a:r>
-              <a:rPr lang="ko-KR" sz="1800">
-                <a:latin typeface="맑은 고딕" charset="0"/>
-                <a:ea typeface="맑은 고딕" charset="0"/>
-              </a:rPr>
-              <a:t>다음</a:t>
-            </a:r>
-            <a:r>
-              <a:rPr lang="ko-KR" sz="1800">
-                <a:latin typeface="맑은 고딕" charset="0"/>
-                <a:ea typeface="맑은 고딕" charset="0"/>
-              </a:rPr>
-              <a:t> </a:t>
-            </a:r>
-            <a:r>
-              <a:rPr lang="ko-KR" sz="1800">
-                <a:latin typeface="맑은 고딕" charset="0"/>
-                <a:ea typeface="맑은 고딕" charset="0"/>
-              </a:rPr>
-              <a:t>Observe라는 스크립트를 생성하고 StoneMonster 오브젝트에 넣어줍니다.</a:t>
+              <a:t>°</a:t>
+            </a:r>
+            <a:r>
+              <a:rPr sz="1800">
+                <a:latin typeface="맑은 고딕" charset="0"/>
+                <a:ea typeface="맑은 고딕" charset="0"/>
+              </a:rPr>
+              <a:t>보다 큰 회전은 표현할 수 없습니다.</a:t>
             </a:r>
             <a:endParaRPr lang="ko-KR" altLang="en-US" sz="1800">
               <a:latin typeface="맑은 고딕" charset="0"/>

</xml_diff>